<commit_message>
add gitignore and fix pyapp
</commit_message>
<xml_diff>
--- a/blunomy.pptx
+++ b/blunomy.pptx
@@ -2,14 +2,14 @@
 <file path=ppt/presentation.xml><?xml version="1.0" encoding="utf-8"?>
 <p:presentation xmlns:a="http://schemas.openxmlformats.org/drawingml/2006/main" xmlns:r="http://schemas.openxmlformats.org/officeDocument/2006/relationships" xmlns:p="http://schemas.openxmlformats.org/presentationml/2006/main" saveSubsetFonts="1">
   <p:sldMasterIdLst>
-    <p:sldMasterId id="2147483648" r:id="rId1"/>
+    <p:sldMasterId id="2147483660" r:id="rId1"/>
   </p:sldMasterIdLst>
   <p:sldIdLst>
     <p:sldId id="256" r:id="rId2"/>
-    <p:sldId id="257" r:id="rId3"/>
-    <p:sldId id="258" r:id="rId4"/>
-    <p:sldId id="259" r:id="rId5"/>
-    <p:sldId id="260" r:id="rId6"/>
+    <p:sldId id="260" r:id="rId3"/>
+    <p:sldId id="257" r:id="rId4"/>
+    <p:sldId id="258" r:id="rId5"/>
+    <p:sldId id="259" r:id="rId6"/>
   </p:sldIdLst>
   <p:sldSz cx="12192000" cy="6858000"/>
   <p:notesSz cx="6858000" cy="9144000"/>
@@ -17,7 +17,7 @@
     <a:defPPr>
       <a:defRPr lang="en-US"/>
     </a:defPPr>
-    <a:lvl1pPr marL="0" algn="l" defTabSz="914400" rtl="0" eaLnBrk="1" latinLnBrk="0" hangingPunct="1">
+    <a:lvl1pPr marL="0" algn="l" defTabSz="457200" rtl="0" eaLnBrk="1" latinLnBrk="0" hangingPunct="1">
       <a:defRPr sz="1800" kern="1200">
         <a:solidFill>
           <a:schemeClr val="tx1"/>
@@ -27,7 +27,7 @@
         <a:cs typeface="+mn-cs"/>
       </a:defRPr>
     </a:lvl1pPr>
-    <a:lvl2pPr marL="457200" algn="l" defTabSz="914400" rtl="0" eaLnBrk="1" latinLnBrk="0" hangingPunct="1">
+    <a:lvl2pPr marL="457200" algn="l" defTabSz="457200" rtl="0" eaLnBrk="1" latinLnBrk="0" hangingPunct="1">
       <a:defRPr sz="1800" kern="1200">
         <a:solidFill>
           <a:schemeClr val="tx1"/>
@@ -37,7 +37,7 @@
         <a:cs typeface="+mn-cs"/>
       </a:defRPr>
     </a:lvl2pPr>
-    <a:lvl3pPr marL="914400" algn="l" defTabSz="914400" rtl="0" eaLnBrk="1" latinLnBrk="0" hangingPunct="1">
+    <a:lvl3pPr marL="914400" algn="l" defTabSz="457200" rtl="0" eaLnBrk="1" latinLnBrk="0" hangingPunct="1">
       <a:defRPr sz="1800" kern="1200">
         <a:solidFill>
           <a:schemeClr val="tx1"/>
@@ -47,7 +47,7 @@
         <a:cs typeface="+mn-cs"/>
       </a:defRPr>
     </a:lvl3pPr>
-    <a:lvl4pPr marL="1371600" algn="l" defTabSz="914400" rtl="0" eaLnBrk="1" latinLnBrk="0" hangingPunct="1">
+    <a:lvl4pPr marL="1371600" algn="l" defTabSz="457200" rtl="0" eaLnBrk="1" latinLnBrk="0" hangingPunct="1">
       <a:defRPr sz="1800" kern="1200">
         <a:solidFill>
           <a:schemeClr val="tx1"/>
@@ -57,7 +57,7 @@
         <a:cs typeface="+mn-cs"/>
       </a:defRPr>
     </a:lvl4pPr>
-    <a:lvl5pPr marL="1828800" algn="l" defTabSz="914400" rtl="0" eaLnBrk="1" latinLnBrk="0" hangingPunct="1">
+    <a:lvl5pPr marL="1828800" algn="l" defTabSz="457200" rtl="0" eaLnBrk="1" latinLnBrk="0" hangingPunct="1">
       <a:defRPr sz="1800" kern="1200">
         <a:solidFill>
           <a:schemeClr val="tx1"/>
@@ -67,7 +67,7 @@
         <a:cs typeface="+mn-cs"/>
       </a:defRPr>
     </a:lvl5pPr>
-    <a:lvl6pPr marL="2286000" algn="l" defTabSz="914400" rtl="0" eaLnBrk="1" latinLnBrk="0" hangingPunct="1">
+    <a:lvl6pPr marL="2286000" algn="l" defTabSz="457200" rtl="0" eaLnBrk="1" latinLnBrk="0" hangingPunct="1">
       <a:defRPr sz="1800" kern="1200">
         <a:solidFill>
           <a:schemeClr val="tx1"/>
@@ -77,7 +77,7 @@
         <a:cs typeface="+mn-cs"/>
       </a:defRPr>
     </a:lvl6pPr>
-    <a:lvl7pPr marL="2743200" algn="l" defTabSz="914400" rtl="0" eaLnBrk="1" latinLnBrk="0" hangingPunct="1">
+    <a:lvl7pPr marL="2743200" algn="l" defTabSz="457200" rtl="0" eaLnBrk="1" latinLnBrk="0" hangingPunct="1">
       <a:defRPr sz="1800" kern="1200">
         <a:solidFill>
           <a:schemeClr val="tx1"/>
@@ -87,7 +87,7 @@
         <a:cs typeface="+mn-cs"/>
       </a:defRPr>
     </a:lvl7pPr>
-    <a:lvl8pPr marL="3200400" algn="l" defTabSz="914400" rtl="0" eaLnBrk="1" latinLnBrk="0" hangingPunct="1">
+    <a:lvl8pPr marL="3200400" algn="l" defTabSz="457200" rtl="0" eaLnBrk="1" latinLnBrk="0" hangingPunct="1">
       <a:defRPr sz="1800" kern="1200">
         <a:solidFill>
           <a:schemeClr val="tx1"/>
@@ -97,7 +97,7 @@
         <a:cs typeface="+mn-cs"/>
       </a:defRPr>
     </a:lvl8pPr>
-    <a:lvl9pPr marL="3657600" algn="l" defTabSz="914400" rtl="0" eaLnBrk="1" latinLnBrk="0" hangingPunct="1">
+    <a:lvl9pPr marL="3657600" algn="l" defTabSz="457200" rtl="0" eaLnBrk="1" latinLnBrk="0" hangingPunct="1">
       <a:defRPr sz="1800" kern="1200">
         <a:solidFill>
           <a:schemeClr val="tx1"/>
@@ -108,6 +108,11 @@
       </a:defRPr>
     </a:lvl9pPr>
   </p:defaultTextStyle>
+  <p:extLst>
+    <p:ext uri="{EFAFB233-063F-42B5-8137-9DF3F51BA10A}">
+      <p15:sldGuideLst xmlns:p15="http://schemas.microsoft.com/office/powerpoint/2012/main"/>
+    </p:ext>
+  </p:extLst>
 </p:presentation>
 </file>
 
@@ -130,13 +135,7 @@
       </p:grpSpPr>
       <p:sp>
         <p:nvSpPr>
-          <p:cNvPr id="2" name="Title 1">
-            <a:extLst>
-              <a:ext uri="{FF2B5EF4-FFF2-40B4-BE49-F238E27FC236}">
-                <a16:creationId xmlns:a16="http://schemas.microsoft.com/office/drawing/2014/main" id="{9A555CA7-A24F-16CF-BA80-FAFC66273AED}"/>
-              </a:ext>
-            </a:extLst>
-          </p:cNvPr>
+          <p:cNvPr id="2" name="Title 1"/>
           <p:cNvSpPr>
             <a:spLocks noGrp="1"/>
           </p:cNvSpPr>
@@ -162,19 +161,13 @@
               <a:rPr lang="en-US"/>
               <a:t>Click to edit Master title style</a:t>
             </a:r>
-            <a:endParaRPr lang="en-AU"/>
-          </a:p>
-        </p:txBody>
-      </p:sp>
-      <p:sp>
-        <p:nvSpPr>
-          <p:cNvPr id="3" name="Subtitle 2">
-            <a:extLst>
-              <a:ext uri="{FF2B5EF4-FFF2-40B4-BE49-F238E27FC236}">
-                <a16:creationId xmlns:a16="http://schemas.microsoft.com/office/drawing/2014/main" id="{463A6677-98AE-BE86-CA1A-7EF49011E789}"/>
-              </a:ext>
-            </a:extLst>
-          </p:cNvPr>
+            <a:endParaRPr lang="en-US" dirty="0"/>
+          </a:p>
+        </p:txBody>
+      </p:sp>
+      <p:sp>
+        <p:nvSpPr>
+          <p:cNvPr id="3" name="Subtitle 2"/>
           <p:cNvSpPr>
             <a:spLocks noGrp="1"/>
           </p:cNvSpPr>
@@ -233,19 +226,13 @@
               <a:rPr lang="en-US"/>
               <a:t>Click to edit Master subtitle style</a:t>
             </a:r>
-            <a:endParaRPr lang="en-AU"/>
-          </a:p>
-        </p:txBody>
-      </p:sp>
-      <p:sp>
-        <p:nvSpPr>
-          <p:cNvPr id="4" name="Date Placeholder 3">
-            <a:extLst>
-              <a:ext uri="{FF2B5EF4-FFF2-40B4-BE49-F238E27FC236}">
-                <a16:creationId xmlns:a16="http://schemas.microsoft.com/office/drawing/2014/main" id="{933C0C86-E614-9292-1AA5-14D1EBE82D0D}"/>
-              </a:ext>
-            </a:extLst>
-          </p:cNvPr>
+            <a:endParaRPr lang="en-US" dirty="0"/>
+          </a:p>
+        </p:txBody>
+      </p:sp>
+      <p:sp>
+        <p:nvSpPr>
+          <p:cNvPr id="4" name="Date Placeholder 3"/>
           <p:cNvSpPr>
             <a:spLocks noGrp="1"/>
           </p:cNvSpPr>
@@ -260,7 +247,7 @@
           <a:p>
             <a:fld id="{05B95601-3CBB-4432-A9C1-49C0EA748C1C}" type="datetimeFigureOut">
               <a:rPr lang="en-AU" smtClean="0"/>
-              <a:t>24/08/2023</a:t>
+              <a:t>28/08/2023</a:t>
             </a:fld>
             <a:endParaRPr lang="en-AU"/>
           </a:p>
@@ -268,13 +255,7 @@
       </p:sp>
       <p:sp>
         <p:nvSpPr>
-          <p:cNvPr id="5" name="Footer Placeholder 4">
-            <a:extLst>
-              <a:ext uri="{FF2B5EF4-FFF2-40B4-BE49-F238E27FC236}">
-                <a16:creationId xmlns:a16="http://schemas.microsoft.com/office/drawing/2014/main" id="{A9DC615B-F883-2D16-86A1-71A86816AF41}"/>
-              </a:ext>
-            </a:extLst>
-          </p:cNvPr>
+          <p:cNvPr id="5" name="Footer Placeholder 4"/>
           <p:cNvSpPr>
             <a:spLocks noGrp="1"/>
           </p:cNvSpPr>
@@ -293,13 +274,7 @@
       </p:sp>
       <p:sp>
         <p:nvSpPr>
-          <p:cNvPr id="6" name="Slide Number Placeholder 5">
-            <a:extLst>
-              <a:ext uri="{FF2B5EF4-FFF2-40B4-BE49-F238E27FC236}">
-                <a16:creationId xmlns:a16="http://schemas.microsoft.com/office/drawing/2014/main" id="{09C25894-8108-28BD-A1CA-8C9202F723EB}"/>
-              </a:ext>
-            </a:extLst>
-          </p:cNvPr>
+          <p:cNvPr id="6" name="Slide Number Placeholder 5"/>
           <p:cNvSpPr>
             <a:spLocks noGrp="1"/>
           </p:cNvSpPr>
@@ -323,7 +298,7 @@
     </p:spTree>
     <p:extLst>
       <p:ext uri="{BB962C8B-B14F-4D97-AF65-F5344CB8AC3E}">
-        <p14:creationId xmlns:p14="http://schemas.microsoft.com/office/powerpoint/2010/main" val="27652263"/>
+        <p14:creationId xmlns:p14="http://schemas.microsoft.com/office/powerpoint/2010/main" val="2556542267"/>
       </p:ext>
     </p:extLst>
   </p:cSld>
@@ -352,13 +327,7 @@
       </p:grpSpPr>
       <p:sp>
         <p:nvSpPr>
-          <p:cNvPr id="2" name="Title 1">
-            <a:extLst>
-              <a:ext uri="{FF2B5EF4-FFF2-40B4-BE49-F238E27FC236}">
-                <a16:creationId xmlns:a16="http://schemas.microsoft.com/office/drawing/2014/main" id="{DE3B6ED9-BAFC-0F2F-52F7-9BBA7B4FE3FB}"/>
-              </a:ext>
-            </a:extLst>
-          </p:cNvPr>
+          <p:cNvPr id="2" name="Title 1"/>
           <p:cNvSpPr>
             <a:spLocks noGrp="1"/>
           </p:cNvSpPr>
@@ -375,19 +344,13 @@
               <a:rPr lang="en-US"/>
               <a:t>Click to edit Master title style</a:t>
             </a:r>
-            <a:endParaRPr lang="en-AU"/>
-          </a:p>
-        </p:txBody>
-      </p:sp>
-      <p:sp>
-        <p:nvSpPr>
-          <p:cNvPr id="3" name="Vertical Text Placeholder 2">
-            <a:extLst>
-              <a:ext uri="{FF2B5EF4-FFF2-40B4-BE49-F238E27FC236}">
-                <a16:creationId xmlns:a16="http://schemas.microsoft.com/office/drawing/2014/main" id="{81F8C6EE-5EAB-F256-6955-37743142DE0A}"/>
-              </a:ext>
-            </a:extLst>
-          </p:cNvPr>
+            <a:endParaRPr lang="en-US" dirty="0"/>
+          </a:p>
+        </p:txBody>
+      </p:sp>
+      <p:sp>
+        <p:nvSpPr>
+          <p:cNvPr id="3" name="Vertical Text Placeholder 2"/>
           <p:cNvSpPr>
             <a:spLocks noGrp="1"/>
           </p:cNvSpPr>
@@ -433,19 +396,13 @@
               <a:rPr lang="en-US"/>
               <a:t>Fifth level</a:t>
             </a:r>
-            <a:endParaRPr lang="en-AU"/>
-          </a:p>
-        </p:txBody>
-      </p:sp>
-      <p:sp>
-        <p:nvSpPr>
-          <p:cNvPr id="4" name="Date Placeholder 3">
-            <a:extLst>
-              <a:ext uri="{FF2B5EF4-FFF2-40B4-BE49-F238E27FC236}">
-                <a16:creationId xmlns:a16="http://schemas.microsoft.com/office/drawing/2014/main" id="{76D7A8FE-1962-5636-B0E7-436A946895A9}"/>
-              </a:ext>
-            </a:extLst>
-          </p:cNvPr>
+            <a:endParaRPr lang="en-US" dirty="0"/>
+          </a:p>
+        </p:txBody>
+      </p:sp>
+      <p:sp>
+        <p:nvSpPr>
+          <p:cNvPr id="4" name="Date Placeholder 3"/>
           <p:cNvSpPr>
             <a:spLocks noGrp="1"/>
           </p:cNvSpPr>
@@ -460,7 +417,7 @@
           <a:p>
             <a:fld id="{05B95601-3CBB-4432-A9C1-49C0EA748C1C}" type="datetimeFigureOut">
               <a:rPr lang="en-AU" smtClean="0"/>
-              <a:t>24/08/2023</a:t>
+              <a:t>28/08/2023</a:t>
             </a:fld>
             <a:endParaRPr lang="en-AU"/>
           </a:p>
@@ -468,13 +425,7 @@
       </p:sp>
       <p:sp>
         <p:nvSpPr>
-          <p:cNvPr id="5" name="Footer Placeholder 4">
-            <a:extLst>
-              <a:ext uri="{FF2B5EF4-FFF2-40B4-BE49-F238E27FC236}">
-                <a16:creationId xmlns:a16="http://schemas.microsoft.com/office/drawing/2014/main" id="{F17EFC6D-0B43-2B4A-B645-DB6E670E4D56}"/>
-              </a:ext>
-            </a:extLst>
-          </p:cNvPr>
+          <p:cNvPr id="5" name="Footer Placeholder 4"/>
           <p:cNvSpPr>
             <a:spLocks noGrp="1"/>
           </p:cNvSpPr>
@@ -493,13 +444,7 @@
       </p:sp>
       <p:sp>
         <p:nvSpPr>
-          <p:cNvPr id="6" name="Slide Number Placeholder 5">
-            <a:extLst>
-              <a:ext uri="{FF2B5EF4-FFF2-40B4-BE49-F238E27FC236}">
-                <a16:creationId xmlns:a16="http://schemas.microsoft.com/office/drawing/2014/main" id="{6376D1BC-58FE-1FED-DD65-C99BEBD0C58C}"/>
-              </a:ext>
-            </a:extLst>
-          </p:cNvPr>
+          <p:cNvPr id="6" name="Slide Number Placeholder 5"/>
           <p:cNvSpPr>
             <a:spLocks noGrp="1"/>
           </p:cNvSpPr>
@@ -523,7 +468,7 @@
     </p:spTree>
     <p:extLst>
       <p:ext uri="{BB962C8B-B14F-4D97-AF65-F5344CB8AC3E}">
-        <p14:creationId xmlns:p14="http://schemas.microsoft.com/office/powerpoint/2010/main" val="320466385"/>
+        <p14:creationId xmlns:p14="http://schemas.microsoft.com/office/powerpoint/2010/main" val="310576388"/>
       </p:ext>
     </p:extLst>
   </p:cSld>
@@ -552,13 +497,7 @@
       </p:grpSpPr>
       <p:sp>
         <p:nvSpPr>
-          <p:cNvPr id="2" name="Vertical Title 1">
-            <a:extLst>
-              <a:ext uri="{FF2B5EF4-FFF2-40B4-BE49-F238E27FC236}">
-                <a16:creationId xmlns:a16="http://schemas.microsoft.com/office/drawing/2014/main" id="{FD09E019-D481-078B-8173-E74F288C113D}"/>
-              </a:ext>
-            </a:extLst>
-          </p:cNvPr>
+          <p:cNvPr id="2" name="Vertical Title 1"/>
           <p:cNvSpPr>
             <a:spLocks noGrp="1"/>
           </p:cNvSpPr>
@@ -580,19 +519,13 @@
               <a:rPr lang="en-US"/>
               <a:t>Click to edit Master title style</a:t>
             </a:r>
-            <a:endParaRPr lang="en-AU"/>
-          </a:p>
-        </p:txBody>
-      </p:sp>
-      <p:sp>
-        <p:nvSpPr>
-          <p:cNvPr id="3" name="Vertical Text Placeholder 2">
-            <a:extLst>
-              <a:ext uri="{FF2B5EF4-FFF2-40B4-BE49-F238E27FC236}">
-                <a16:creationId xmlns:a16="http://schemas.microsoft.com/office/drawing/2014/main" id="{3C3EAF4C-484A-46FF-8CF8-612495202F88}"/>
-              </a:ext>
-            </a:extLst>
-          </p:cNvPr>
+            <a:endParaRPr lang="en-US" dirty="0"/>
+          </a:p>
+        </p:txBody>
+      </p:sp>
+      <p:sp>
+        <p:nvSpPr>
+          <p:cNvPr id="3" name="Vertical Text Placeholder 2"/>
           <p:cNvSpPr>
             <a:spLocks noGrp="1"/>
           </p:cNvSpPr>
@@ -643,19 +576,13 @@
               <a:rPr lang="en-US"/>
               <a:t>Fifth level</a:t>
             </a:r>
-            <a:endParaRPr lang="en-AU"/>
-          </a:p>
-        </p:txBody>
-      </p:sp>
-      <p:sp>
-        <p:nvSpPr>
-          <p:cNvPr id="4" name="Date Placeholder 3">
-            <a:extLst>
-              <a:ext uri="{FF2B5EF4-FFF2-40B4-BE49-F238E27FC236}">
-                <a16:creationId xmlns:a16="http://schemas.microsoft.com/office/drawing/2014/main" id="{08BBDF68-85B2-EDFA-F0DB-29BCD53BC7C5}"/>
-              </a:ext>
-            </a:extLst>
-          </p:cNvPr>
+            <a:endParaRPr lang="en-US" dirty="0"/>
+          </a:p>
+        </p:txBody>
+      </p:sp>
+      <p:sp>
+        <p:nvSpPr>
+          <p:cNvPr id="4" name="Date Placeholder 3"/>
           <p:cNvSpPr>
             <a:spLocks noGrp="1"/>
           </p:cNvSpPr>
@@ -670,7 +597,7 @@
           <a:p>
             <a:fld id="{05B95601-3CBB-4432-A9C1-49C0EA748C1C}" type="datetimeFigureOut">
               <a:rPr lang="en-AU" smtClean="0"/>
-              <a:t>24/08/2023</a:t>
+              <a:t>28/08/2023</a:t>
             </a:fld>
             <a:endParaRPr lang="en-AU"/>
           </a:p>
@@ -678,13 +605,7 @@
       </p:sp>
       <p:sp>
         <p:nvSpPr>
-          <p:cNvPr id="5" name="Footer Placeholder 4">
-            <a:extLst>
-              <a:ext uri="{FF2B5EF4-FFF2-40B4-BE49-F238E27FC236}">
-                <a16:creationId xmlns:a16="http://schemas.microsoft.com/office/drawing/2014/main" id="{50B584AA-7562-5727-E604-3C6476BFF55F}"/>
-              </a:ext>
-            </a:extLst>
-          </p:cNvPr>
+          <p:cNvPr id="5" name="Footer Placeholder 4"/>
           <p:cNvSpPr>
             <a:spLocks noGrp="1"/>
           </p:cNvSpPr>
@@ -703,13 +624,7 @@
       </p:sp>
       <p:sp>
         <p:nvSpPr>
-          <p:cNvPr id="6" name="Slide Number Placeholder 5">
-            <a:extLst>
-              <a:ext uri="{FF2B5EF4-FFF2-40B4-BE49-F238E27FC236}">
-                <a16:creationId xmlns:a16="http://schemas.microsoft.com/office/drawing/2014/main" id="{14BE188D-4CFF-98E0-5CAB-6C0020E95DDE}"/>
-              </a:ext>
-            </a:extLst>
-          </p:cNvPr>
+          <p:cNvPr id="6" name="Slide Number Placeholder 5"/>
           <p:cNvSpPr>
             <a:spLocks noGrp="1"/>
           </p:cNvSpPr>
@@ -733,7 +648,7 @@
     </p:spTree>
     <p:extLst>
       <p:ext uri="{BB962C8B-B14F-4D97-AF65-F5344CB8AC3E}">
-        <p14:creationId xmlns:p14="http://schemas.microsoft.com/office/powerpoint/2010/main" val="3655344142"/>
+        <p14:creationId xmlns:p14="http://schemas.microsoft.com/office/powerpoint/2010/main" val="719360891"/>
       </p:ext>
     </p:extLst>
   </p:cSld>
@@ -762,13 +677,7 @@
       </p:grpSpPr>
       <p:sp>
         <p:nvSpPr>
-          <p:cNvPr id="2" name="Title 1">
-            <a:extLst>
-              <a:ext uri="{FF2B5EF4-FFF2-40B4-BE49-F238E27FC236}">
-                <a16:creationId xmlns:a16="http://schemas.microsoft.com/office/drawing/2014/main" id="{94C72B7A-CDC5-BB3E-CF07-7BD2610E746A}"/>
-              </a:ext>
-            </a:extLst>
-          </p:cNvPr>
+          <p:cNvPr id="2" name="Title 1"/>
           <p:cNvSpPr>
             <a:spLocks noGrp="1"/>
           </p:cNvSpPr>
@@ -785,19 +694,13 @@
               <a:rPr lang="en-US"/>
               <a:t>Click to edit Master title style</a:t>
             </a:r>
-            <a:endParaRPr lang="en-AU"/>
-          </a:p>
-        </p:txBody>
-      </p:sp>
-      <p:sp>
-        <p:nvSpPr>
-          <p:cNvPr id="3" name="Content Placeholder 2">
-            <a:extLst>
-              <a:ext uri="{FF2B5EF4-FFF2-40B4-BE49-F238E27FC236}">
-                <a16:creationId xmlns:a16="http://schemas.microsoft.com/office/drawing/2014/main" id="{A010EBF9-392A-9C74-BE66-A4652C669C74}"/>
-              </a:ext>
-            </a:extLst>
-          </p:cNvPr>
+            <a:endParaRPr lang="en-US" dirty="0"/>
+          </a:p>
+        </p:txBody>
+      </p:sp>
+      <p:sp>
+        <p:nvSpPr>
+          <p:cNvPr id="3" name="Content Placeholder 2"/>
           <p:cNvSpPr>
             <a:spLocks noGrp="1"/>
           </p:cNvSpPr>
@@ -843,19 +746,13 @@
               <a:rPr lang="en-US"/>
               <a:t>Fifth level</a:t>
             </a:r>
-            <a:endParaRPr lang="en-AU"/>
-          </a:p>
-        </p:txBody>
-      </p:sp>
-      <p:sp>
-        <p:nvSpPr>
-          <p:cNvPr id="4" name="Date Placeholder 3">
-            <a:extLst>
-              <a:ext uri="{FF2B5EF4-FFF2-40B4-BE49-F238E27FC236}">
-                <a16:creationId xmlns:a16="http://schemas.microsoft.com/office/drawing/2014/main" id="{6D48BAA4-67C5-68CE-DAC6-0F525EAAF5C0}"/>
-              </a:ext>
-            </a:extLst>
-          </p:cNvPr>
+            <a:endParaRPr lang="en-US" dirty="0"/>
+          </a:p>
+        </p:txBody>
+      </p:sp>
+      <p:sp>
+        <p:nvSpPr>
+          <p:cNvPr id="4" name="Date Placeholder 3"/>
           <p:cNvSpPr>
             <a:spLocks noGrp="1"/>
           </p:cNvSpPr>
@@ -870,7 +767,7 @@
           <a:p>
             <a:fld id="{05B95601-3CBB-4432-A9C1-49C0EA748C1C}" type="datetimeFigureOut">
               <a:rPr lang="en-AU" smtClean="0"/>
-              <a:t>24/08/2023</a:t>
+              <a:t>28/08/2023</a:t>
             </a:fld>
             <a:endParaRPr lang="en-AU"/>
           </a:p>
@@ -878,13 +775,7 @@
       </p:sp>
       <p:sp>
         <p:nvSpPr>
-          <p:cNvPr id="5" name="Footer Placeholder 4">
-            <a:extLst>
-              <a:ext uri="{FF2B5EF4-FFF2-40B4-BE49-F238E27FC236}">
-                <a16:creationId xmlns:a16="http://schemas.microsoft.com/office/drawing/2014/main" id="{3FE4863C-E19E-CE66-48D7-FC05953AB2B6}"/>
-              </a:ext>
-            </a:extLst>
-          </p:cNvPr>
+          <p:cNvPr id="5" name="Footer Placeholder 4"/>
           <p:cNvSpPr>
             <a:spLocks noGrp="1"/>
           </p:cNvSpPr>
@@ -903,13 +794,7 @@
       </p:sp>
       <p:sp>
         <p:nvSpPr>
-          <p:cNvPr id="6" name="Slide Number Placeholder 5">
-            <a:extLst>
-              <a:ext uri="{FF2B5EF4-FFF2-40B4-BE49-F238E27FC236}">
-                <a16:creationId xmlns:a16="http://schemas.microsoft.com/office/drawing/2014/main" id="{3806FA2C-77C8-6697-A47C-1ABEA73B66CA}"/>
-              </a:ext>
-            </a:extLst>
-          </p:cNvPr>
+          <p:cNvPr id="6" name="Slide Number Placeholder 5"/>
           <p:cNvSpPr>
             <a:spLocks noGrp="1"/>
           </p:cNvSpPr>
@@ -933,7 +818,7 @@
     </p:spTree>
     <p:extLst>
       <p:ext uri="{BB962C8B-B14F-4D97-AF65-F5344CB8AC3E}">
-        <p14:creationId xmlns:p14="http://schemas.microsoft.com/office/powerpoint/2010/main" val="3155168919"/>
+        <p14:creationId xmlns:p14="http://schemas.microsoft.com/office/powerpoint/2010/main" val="2100453570"/>
       </p:ext>
     </p:extLst>
   </p:cSld>
@@ -962,13 +847,7 @@
       </p:grpSpPr>
       <p:sp>
         <p:nvSpPr>
-          <p:cNvPr id="2" name="Title 1">
-            <a:extLst>
-              <a:ext uri="{FF2B5EF4-FFF2-40B4-BE49-F238E27FC236}">
-                <a16:creationId xmlns:a16="http://schemas.microsoft.com/office/drawing/2014/main" id="{5C5CF798-3082-F450-7C30-E851580EC663}"/>
-              </a:ext>
-            </a:extLst>
-          </p:cNvPr>
+          <p:cNvPr id="2" name="Title 1"/>
           <p:cNvSpPr>
             <a:spLocks noGrp="1"/>
           </p:cNvSpPr>
@@ -994,19 +873,13 @@
               <a:rPr lang="en-US"/>
               <a:t>Click to edit Master title style</a:t>
             </a:r>
-            <a:endParaRPr lang="en-AU"/>
-          </a:p>
-        </p:txBody>
-      </p:sp>
-      <p:sp>
-        <p:nvSpPr>
-          <p:cNvPr id="3" name="Text Placeholder 2">
-            <a:extLst>
-              <a:ext uri="{FF2B5EF4-FFF2-40B4-BE49-F238E27FC236}">
-                <a16:creationId xmlns:a16="http://schemas.microsoft.com/office/drawing/2014/main" id="{C878274E-FFCA-8DD6-DFC3-8087634F3968}"/>
-              </a:ext>
-            </a:extLst>
-          </p:cNvPr>
+            <a:endParaRPr lang="en-US" dirty="0"/>
+          </a:p>
+        </p:txBody>
+      </p:sp>
+      <p:sp>
+        <p:nvSpPr>
+          <p:cNvPr id="3" name="Text Placeholder 2"/>
           <p:cNvSpPr>
             <a:spLocks noGrp="1"/>
           </p:cNvSpPr>
@@ -1125,13 +998,7 @@
       </p:sp>
       <p:sp>
         <p:nvSpPr>
-          <p:cNvPr id="4" name="Date Placeholder 3">
-            <a:extLst>
-              <a:ext uri="{FF2B5EF4-FFF2-40B4-BE49-F238E27FC236}">
-                <a16:creationId xmlns:a16="http://schemas.microsoft.com/office/drawing/2014/main" id="{95B7D8D1-ED3F-CF51-0EDD-1D30273E0595}"/>
-              </a:ext>
-            </a:extLst>
-          </p:cNvPr>
+          <p:cNvPr id="4" name="Date Placeholder 3"/>
           <p:cNvSpPr>
             <a:spLocks noGrp="1"/>
           </p:cNvSpPr>
@@ -1146,7 +1013,7 @@
           <a:p>
             <a:fld id="{05B95601-3CBB-4432-A9C1-49C0EA748C1C}" type="datetimeFigureOut">
               <a:rPr lang="en-AU" smtClean="0"/>
-              <a:t>24/08/2023</a:t>
+              <a:t>28/08/2023</a:t>
             </a:fld>
             <a:endParaRPr lang="en-AU"/>
           </a:p>
@@ -1154,13 +1021,7 @@
       </p:sp>
       <p:sp>
         <p:nvSpPr>
-          <p:cNvPr id="5" name="Footer Placeholder 4">
-            <a:extLst>
-              <a:ext uri="{FF2B5EF4-FFF2-40B4-BE49-F238E27FC236}">
-                <a16:creationId xmlns:a16="http://schemas.microsoft.com/office/drawing/2014/main" id="{CEC9FEED-2860-5EAD-809C-6491D97964AA}"/>
-              </a:ext>
-            </a:extLst>
-          </p:cNvPr>
+          <p:cNvPr id="5" name="Footer Placeholder 4"/>
           <p:cNvSpPr>
             <a:spLocks noGrp="1"/>
           </p:cNvSpPr>
@@ -1179,13 +1040,7 @@
       </p:sp>
       <p:sp>
         <p:nvSpPr>
-          <p:cNvPr id="6" name="Slide Number Placeholder 5">
-            <a:extLst>
-              <a:ext uri="{FF2B5EF4-FFF2-40B4-BE49-F238E27FC236}">
-                <a16:creationId xmlns:a16="http://schemas.microsoft.com/office/drawing/2014/main" id="{0DB8809A-4893-6CB7-DEBD-343C353ECD6C}"/>
-              </a:ext>
-            </a:extLst>
-          </p:cNvPr>
+          <p:cNvPr id="6" name="Slide Number Placeholder 5"/>
           <p:cNvSpPr>
             <a:spLocks noGrp="1"/>
           </p:cNvSpPr>
@@ -1209,7 +1064,7 @@
     </p:spTree>
     <p:extLst>
       <p:ext uri="{BB962C8B-B14F-4D97-AF65-F5344CB8AC3E}">
-        <p14:creationId xmlns:p14="http://schemas.microsoft.com/office/powerpoint/2010/main" val="3973947152"/>
+        <p14:creationId xmlns:p14="http://schemas.microsoft.com/office/powerpoint/2010/main" val="3945430666"/>
       </p:ext>
     </p:extLst>
   </p:cSld>
@@ -1238,13 +1093,7 @@
       </p:grpSpPr>
       <p:sp>
         <p:nvSpPr>
-          <p:cNvPr id="2" name="Title 1">
-            <a:extLst>
-              <a:ext uri="{FF2B5EF4-FFF2-40B4-BE49-F238E27FC236}">
-                <a16:creationId xmlns:a16="http://schemas.microsoft.com/office/drawing/2014/main" id="{DFE997A0-9D23-3C17-E8E0-6671C14BDEBE}"/>
-              </a:ext>
-            </a:extLst>
-          </p:cNvPr>
+          <p:cNvPr id="2" name="Title 1"/>
           <p:cNvSpPr>
             <a:spLocks noGrp="1"/>
           </p:cNvSpPr>
@@ -1261,19 +1110,13 @@
               <a:rPr lang="en-US"/>
               <a:t>Click to edit Master title style</a:t>
             </a:r>
-            <a:endParaRPr lang="en-AU"/>
-          </a:p>
-        </p:txBody>
-      </p:sp>
-      <p:sp>
-        <p:nvSpPr>
-          <p:cNvPr id="3" name="Content Placeholder 2">
-            <a:extLst>
-              <a:ext uri="{FF2B5EF4-FFF2-40B4-BE49-F238E27FC236}">
-                <a16:creationId xmlns:a16="http://schemas.microsoft.com/office/drawing/2014/main" id="{7BF88AB2-8031-EECD-AF39-D77EB17B70A8}"/>
-              </a:ext>
-            </a:extLst>
-          </p:cNvPr>
+            <a:endParaRPr lang="en-US" dirty="0"/>
+          </a:p>
+        </p:txBody>
+      </p:sp>
+      <p:sp>
+        <p:nvSpPr>
+          <p:cNvPr id="3" name="Content Placeholder 2"/>
           <p:cNvSpPr>
             <a:spLocks noGrp="1"/>
           </p:cNvSpPr>
@@ -1324,19 +1167,13 @@
               <a:rPr lang="en-US"/>
               <a:t>Fifth level</a:t>
             </a:r>
-            <a:endParaRPr lang="en-AU"/>
-          </a:p>
-        </p:txBody>
-      </p:sp>
-      <p:sp>
-        <p:nvSpPr>
-          <p:cNvPr id="4" name="Content Placeholder 3">
-            <a:extLst>
-              <a:ext uri="{FF2B5EF4-FFF2-40B4-BE49-F238E27FC236}">
-                <a16:creationId xmlns:a16="http://schemas.microsoft.com/office/drawing/2014/main" id="{A3D2BCA5-1AEE-2EF7-1943-1EDFD64DDAB1}"/>
-              </a:ext>
-            </a:extLst>
-          </p:cNvPr>
+            <a:endParaRPr lang="en-US" dirty="0"/>
+          </a:p>
+        </p:txBody>
+      </p:sp>
+      <p:sp>
+        <p:nvSpPr>
+          <p:cNvPr id="4" name="Content Placeholder 3"/>
           <p:cNvSpPr>
             <a:spLocks noGrp="1"/>
           </p:cNvSpPr>
@@ -1387,19 +1224,13 @@
               <a:rPr lang="en-US"/>
               <a:t>Fifth level</a:t>
             </a:r>
-            <a:endParaRPr lang="en-AU"/>
-          </a:p>
-        </p:txBody>
-      </p:sp>
-      <p:sp>
-        <p:nvSpPr>
-          <p:cNvPr id="5" name="Date Placeholder 4">
-            <a:extLst>
-              <a:ext uri="{FF2B5EF4-FFF2-40B4-BE49-F238E27FC236}">
-                <a16:creationId xmlns:a16="http://schemas.microsoft.com/office/drawing/2014/main" id="{1CB6B53D-5A73-1AF3-2D00-BAEED4407C5B}"/>
-              </a:ext>
-            </a:extLst>
-          </p:cNvPr>
+            <a:endParaRPr lang="en-US" dirty="0"/>
+          </a:p>
+        </p:txBody>
+      </p:sp>
+      <p:sp>
+        <p:nvSpPr>
+          <p:cNvPr id="5" name="Date Placeholder 4"/>
           <p:cNvSpPr>
             <a:spLocks noGrp="1"/>
           </p:cNvSpPr>
@@ -1414,7 +1245,7 @@
           <a:p>
             <a:fld id="{05B95601-3CBB-4432-A9C1-49C0EA748C1C}" type="datetimeFigureOut">
               <a:rPr lang="en-AU" smtClean="0"/>
-              <a:t>24/08/2023</a:t>
+              <a:t>28/08/2023</a:t>
             </a:fld>
             <a:endParaRPr lang="en-AU"/>
           </a:p>
@@ -1422,13 +1253,7 @@
       </p:sp>
       <p:sp>
         <p:nvSpPr>
-          <p:cNvPr id="6" name="Footer Placeholder 5">
-            <a:extLst>
-              <a:ext uri="{FF2B5EF4-FFF2-40B4-BE49-F238E27FC236}">
-                <a16:creationId xmlns:a16="http://schemas.microsoft.com/office/drawing/2014/main" id="{36D21373-2B8F-CA88-1533-6B08F4361AB6}"/>
-              </a:ext>
-            </a:extLst>
-          </p:cNvPr>
+          <p:cNvPr id="6" name="Footer Placeholder 5"/>
           <p:cNvSpPr>
             <a:spLocks noGrp="1"/>
           </p:cNvSpPr>
@@ -1447,13 +1272,7 @@
       </p:sp>
       <p:sp>
         <p:nvSpPr>
-          <p:cNvPr id="7" name="Slide Number Placeholder 6">
-            <a:extLst>
-              <a:ext uri="{FF2B5EF4-FFF2-40B4-BE49-F238E27FC236}">
-                <a16:creationId xmlns:a16="http://schemas.microsoft.com/office/drawing/2014/main" id="{0B59303D-F08E-2351-0EDD-4679CD01DC8E}"/>
-              </a:ext>
-            </a:extLst>
-          </p:cNvPr>
+          <p:cNvPr id="7" name="Slide Number Placeholder 6"/>
           <p:cNvSpPr>
             <a:spLocks noGrp="1"/>
           </p:cNvSpPr>
@@ -1477,7 +1296,7 @@
     </p:spTree>
     <p:extLst>
       <p:ext uri="{BB962C8B-B14F-4D97-AF65-F5344CB8AC3E}">
-        <p14:creationId xmlns:p14="http://schemas.microsoft.com/office/powerpoint/2010/main" val="566204128"/>
+        <p14:creationId xmlns:p14="http://schemas.microsoft.com/office/powerpoint/2010/main" val="325539529"/>
       </p:ext>
     </p:extLst>
   </p:cSld>
@@ -1506,13 +1325,7 @@
       </p:grpSpPr>
       <p:sp>
         <p:nvSpPr>
-          <p:cNvPr id="2" name="Title 1">
-            <a:extLst>
-              <a:ext uri="{FF2B5EF4-FFF2-40B4-BE49-F238E27FC236}">
-                <a16:creationId xmlns:a16="http://schemas.microsoft.com/office/drawing/2014/main" id="{C107C6CB-DF54-D815-7D48-997D070C1DE8}"/>
-              </a:ext>
-            </a:extLst>
-          </p:cNvPr>
+          <p:cNvPr id="2" name="Title 1"/>
           <p:cNvSpPr>
             <a:spLocks noGrp="1"/>
           </p:cNvSpPr>
@@ -1534,19 +1347,13 @@
               <a:rPr lang="en-US"/>
               <a:t>Click to edit Master title style</a:t>
             </a:r>
-            <a:endParaRPr lang="en-AU"/>
-          </a:p>
-        </p:txBody>
-      </p:sp>
-      <p:sp>
-        <p:nvSpPr>
-          <p:cNvPr id="3" name="Text Placeholder 2">
-            <a:extLst>
-              <a:ext uri="{FF2B5EF4-FFF2-40B4-BE49-F238E27FC236}">
-                <a16:creationId xmlns:a16="http://schemas.microsoft.com/office/drawing/2014/main" id="{FF5A9AE0-0CBD-21C5-8271-5776A639BABB}"/>
-              </a:ext>
-            </a:extLst>
-          </p:cNvPr>
+            <a:endParaRPr lang="en-US" dirty="0"/>
+          </a:p>
+        </p:txBody>
+      </p:sp>
+      <p:sp>
+        <p:nvSpPr>
+          <p:cNvPr id="3" name="Text Placeholder 2"/>
           <p:cNvSpPr>
             <a:spLocks noGrp="1"/>
           </p:cNvSpPr>
@@ -1611,13 +1418,7 @@
       </p:sp>
       <p:sp>
         <p:nvSpPr>
-          <p:cNvPr id="4" name="Content Placeholder 3">
-            <a:extLst>
-              <a:ext uri="{FF2B5EF4-FFF2-40B4-BE49-F238E27FC236}">
-                <a16:creationId xmlns:a16="http://schemas.microsoft.com/office/drawing/2014/main" id="{71674E0B-4550-1874-F7B0-EC43E027261C}"/>
-              </a:ext>
-            </a:extLst>
-          </p:cNvPr>
+          <p:cNvPr id="4" name="Content Placeholder 3"/>
           <p:cNvSpPr>
             <a:spLocks noGrp="1"/>
           </p:cNvSpPr>
@@ -1668,19 +1469,13 @@
               <a:rPr lang="en-US"/>
               <a:t>Fifth level</a:t>
             </a:r>
-            <a:endParaRPr lang="en-AU"/>
-          </a:p>
-        </p:txBody>
-      </p:sp>
-      <p:sp>
-        <p:nvSpPr>
-          <p:cNvPr id="5" name="Text Placeholder 4">
-            <a:extLst>
-              <a:ext uri="{FF2B5EF4-FFF2-40B4-BE49-F238E27FC236}">
-                <a16:creationId xmlns:a16="http://schemas.microsoft.com/office/drawing/2014/main" id="{D49C1ED7-5918-B3FA-8B9A-A4F2C08AA5A8}"/>
-              </a:ext>
-            </a:extLst>
-          </p:cNvPr>
+            <a:endParaRPr lang="en-US" dirty="0"/>
+          </a:p>
+        </p:txBody>
+      </p:sp>
+      <p:sp>
+        <p:nvSpPr>
+          <p:cNvPr id="5" name="Text Placeholder 4"/>
           <p:cNvSpPr>
             <a:spLocks noGrp="1"/>
           </p:cNvSpPr>
@@ -1745,13 +1540,7 @@
       </p:sp>
       <p:sp>
         <p:nvSpPr>
-          <p:cNvPr id="6" name="Content Placeholder 5">
-            <a:extLst>
-              <a:ext uri="{FF2B5EF4-FFF2-40B4-BE49-F238E27FC236}">
-                <a16:creationId xmlns:a16="http://schemas.microsoft.com/office/drawing/2014/main" id="{B14DE192-A492-8E11-4BC5-C9D278D19C7A}"/>
-              </a:ext>
-            </a:extLst>
-          </p:cNvPr>
+          <p:cNvPr id="6" name="Content Placeholder 5"/>
           <p:cNvSpPr>
             <a:spLocks noGrp="1"/>
           </p:cNvSpPr>
@@ -1802,19 +1591,13 @@
               <a:rPr lang="en-US"/>
               <a:t>Fifth level</a:t>
             </a:r>
-            <a:endParaRPr lang="en-AU"/>
-          </a:p>
-        </p:txBody>
-      </p:sp>
-      <p:sp>
-        <p:nvSpPr>
-          <p:cNvPr id="7" name="Date Placeholder 6">
-            <a:extLst>
-              <a:ext uri="{FF2B5EF4-FFF2-40B4-BE49-F238E27FC236}">
-                <a16:creationId xmlns:a16="http://schemas.microsoft.com/office/drawing/2014/main" id="{1374566F-FB61-268E-DA04-960369B95526}"/>
-              </a:ext>
-            </a:extLst>
-          </p:cNvPr>
+            <a:endParaRPr lang="en-US" dirty="0"/>
+          </a:p>
+        </p:txBody>
+      </p:sp>
+      <p:sp>
+        <p:nvSpPr>
+          <p:cNvPr id="7" name="Date Placeholder 6"/>
           <p:cNvSpPr>
             <a:spLocks noGrp="1"/>
           </p:cNvSpPr>
@@ -1829,7 +1612,7 @@
           <a:p>
             <a:fld id="{05B95601-3CBB-4432-A9C1-49C0EA748C1C}" type="datetimeFigureOut">
               <a:rPr lang="en-AU" smtClean="0"/>
-              <a:t>24/08/2023</a:t>
+              <a:t>28/08/2023</a:t>
             </a:fld>
             <a:endParaRPr lang="en-AU"/>
           </a:p>
@@ -1837,13 +1620,7 @@
       </p:sp>
       <p:sp>
         <p:nvSpPr>
-          <p:cNvPr id="8" name="Footer Placeholder 7">
-            <a:extLst>
-              <a:ext uri="{FF2B5EF4-FFF2-40B4-BE49-F238E27FC236}">
-                <a16:creationId xmlns:a16="http://schemas.microsoft.com/office/drawing/2014/main" id="{97DA981A-AB5A-D41C-90A3-C19FB78DB504}"/>
-              </a:ext>
-            </a:extLst>
-          </p:cNvPr>
+          <p:cNvPr id="8" name="Footer Placeholder 7"/>
           <p:cNvSpPr>
             <a:spLocks noGrp="1"/>
           </p:cNvSpPr>
@@ -1862,13 +1639,7 @@
       </p:sp>
       <p:sp>
         <p:nvSpPr>
-          <p:cNvPr id="9" name="Slide Number Placeholder 8">
-            <a:extLst>
-              <a:ext uri="{FF2B5EF4-FFF2-40B4-BE49-F238E27FC236}">
-                <a16:creationId xmlns:a16="http://schemas.microsoft.com/office/drawing/2014/main" id="{9B9CD93D-C831-67AE-C649-583AD1717711}"/>
-              </a:ext>
-            </a:extLst>
-          </p:cNvPr>
+          <p:cNvPr id="9" name="Slide Number Placeholder 8"/>
           <p:cNvSpPr>
             <a:spLocks noGrp="1"/>
           </p:cNvSpPr>
@@ -1892,7 +1663,7 @@
     </p:spTree>
     <p:extLst>
       <p:ext uri="{BB962C8B-B14F-4D97-AF65-F5344CB8AC3E}">
-        <p14:creationId xmlns:p14="http://schemas.microsoft.com/office/powerpoint/2010/main" val="856092254"/>
+        <p14:creationId xmlns:p14="http://schemas.microsoft.com/office/powerpoint/2010/main" val="3408510197"/>
       </p:ext>
     </p:extLst>
   </p:cSld>
@@ -1921,13 +1692,7 @@
       </p:grpSpPr>
       <p:sp>
         <p:nvSpPr>
-          <p:cNvPr id="2" name="Title 1">
-            <a:extLst>
-              <a:ext uri="{FF2B5EF4-FFF2-40B4-BE49-F238E27FC236}">
-                <a16:creationId xmlns:a16="http://schemas.microsoft.com/office/drawing/2014/main" id="{783093DE-7BFF-82D0-A17C-1D5AB11F86C9}"/>
-              </a:ext>
-            </a:extLst>
-          </p:cNvPr>
+          <p:cNvPr id="2" name="Title 1"/>
           <p:cNvSpPr>
             <a:spLocks noGrp="1"/>
           </p:cNvSpPr>
@@ -1944,19 +1709,13 @@
               <a:rPr lang="en-US"/>
               <a:t>Click to edit Master title style</a:t>
             </a:r>
-            <a:endParaRPr lang="en-AU"/>
-          </a:p>
-        </p:txBody>
-      </p:sp>
-      <p:sp>
-        <p:nvSpPr>
-          <p:cNvPr id="3" name="Date Placeholder 2">
-            <a:extLst>
-              <a:ext uri="{FF2B5EF4-FFF2-40B4-BE49-F238E27FC236}">
-                <a16:creationId xmlns:a16="http://schemas.microsoft.com/office/drawing/2014/main" id="{7DC5B57F-253A-0C94-2B24-AB18DEC0FE17}"/>
-              </a:ext>
-            </a:extLst>
-          </p:cNvPr>
+            <a:endParaRPr lang="en-US" dirty="0"/>
+          </a:p>
+        </p:txBody>
+      </p:sp>
+      <p:sp>
+        <p:nvSpPr>
+          <p:cNvPr id="3" name="Date Placeholder 2"/>
           <p:cNvSpPr>
             <a:spLocks noGrp="1"/>
           </p:cNvSpPr>
@@ -1971,7 +1730,7 @@
           <a:p>
             <a:fld id="{05B95601-3CBB-4432-A9C1-49C0EA748C1C}" type="datetimeFigureOut">
               <a:rPr lang="en-AU" smtClean="0"/>
-              <a:t>24/08/2023</a:t>
+              <a:t>28/08/2023</a:t>
             </a:fld>
             <a:endParaRPr lang="en-AU"/>
           </a:p>
@@ -1979,13 +1738,7 @@
       </p:sp>
       <p:sp>
         <p:nvSpPr>
-          <p:cNvPr id="4" name="Footer Placeholder 3">
-            <a:extLst>
-              <a:ext uri="{FF2B5EF4-FFF2-40B4-BE49-F238E27FC236}">
-                <a16:creationId xmlns:a16="http://schemas.microsoft.com/office/drawing/2014/main" id="{C22F85B9-C700-4463-579E-B389833EECB2}"/>
-              </a:ext>
-            </a:extLst>
-          </p:cNvPr>
+          <p:cNvPr id="4" name="Footer Placeholder 3"/>
           <p:cNvSpPr>
             <a:spLocks noGrp="1"/>
           </p:cNvSpPr>
@@ -2004,13 +1757,7 @@
       </p:sp>
       <p:sp>
         <p:nvSpPr>
-          <p:cNvPr id="5" name="Slide Number Placeholder 4">
-            <a:extLst>
-              <a:ext uri="{FF2B5EF4-FFF2-40B4-BE49-F238E27FC236}">
-                <a16:creationId xmlns:a16="http://schemas.microsoft.com/office/drawing/2014/main" id="{9FEB1FCE-F9BB-82E2-A072-1A06A4CB80B4}"/>
-              </a:ext>
-            </a:extLst>
-          </p:cNvPr>
+          <p:cNvPr id="5" name="Slide Number Placeholder 4"/>
           <p:cNvSpPr>
             <a:spLocks noGrp="1"/>
           </p:cNvSpPr>
@@ -2034,7 +1781,7 @@
     </p:spTree>
     <p:extLst>
       <p:ext uri="{BB962C8B-B14F-4D97-AF65-F5344CB8AC3E}">
-        <p14:creationId xmlns:p14="http://schemas.microsoft.com/office/powerpoint/2010/main" val="2034808358"/>
+        <p14:creationId xmlns:p14="http://schemas.microsoft.com/office/powerpoint/2010/main" val="2975052551"/>
       </p:ext>
     </p:extLst>
   </p:cSld>
@@ -2063,13 +1810,7 @@
       </p:grpSpPr>
       <p:sp>
         <p:nvSpPr>
-          <p:cNvPr id="2" name="Date Placeholder 1">
-            <a:extLst>
-              <a:ext uri="{FF2B5EF4-FFF2-40B4-BE49-F238E27FC236}">
-                <a16:creationId xmlns:a16="http://schemas.microsoft.com/office/drawing/2014/main" id="{197A4B84-195C-CF42-C437-4E55B10C981F}"/>
-              </a:ext>
-            </a:extLst>
-          </p:cNvPr>
+          <p:cNvPr id="2" name="Date Placeholder 1"/>
           <p:cNvSpPr>
             <a:spLocks noGrp="1"/>
           </p:cNvSpPr>
@@ -2084,7 +1825,7 @@
           <a:p>
             <a:fld id="{05B95601-3CBB-4432-A9C1-49C0EA748C1C}" type="datetimeFigureOut">
               <a:rPr lang="en-AU" smtClean="0"/>
-              <a:t>24/08/2023</a:t>
+              <a:t>28/08/2023</a:t>
             </a:fld>
             <a:endParaRPr lang="en-AU"/>
           </a:p>
@@ -2092,13 +1833,7 @@
       </p:sp>
       <p:sp>
         <p:nvSpPr>
-          <p:cNvPr id="3" name="Footer Placeholder 2">
-            <a:extLst>
-              <a:ext uri="{FF2B5EF4-FFF2-40B4-BE49-F238E27FC236}">
-                <a16:creationId xmlns:a16="http://schemas.microsoft.com/office/drawing/2014/main" id="{D18439FA-56E1-1A5B-25C4-D584BF7E4908}"/>
-              </a:ext>
-            </a:extLst>
-          </p:cNvPr>
+          <p:cNvPr id="3" name="Footer Placeholder 2"/>
           <p:cNvSpPr>
             <a:spLocks noGrp="1"/>
           </p:cNvSpPr>
@@ -2117,13 +1852,7 @@
       </p:sp>
       <p:sp>
         <p:nvSpPr>
-          <p:cNvPr id="4" name="Slide Number Placeholder 3">
-            <a:extLst>
-              <a:ext uri="{FF2B5EF4-FFF2-40B4-BE49-F238E27FC236}">
-                <a16:creationId xmlns:a16="http://schemas.microsoft.com/office/drawing/2014/main" id="{18C06A8E-BBC7-E2D9-7CC8-A6BA2FBD2E81}"/>
-              </a:ext>
-            </a:extLst>
-          </p:cNvPr>
+          <p:cNvPr id="4" name="Slide Number Placeholder 3"/>
           <p:cNvSpPr>
             <a:spLocks noGrp="1"/>
           </p:cNvSpPr>
@@ -2147,7 +1876,7 @@
     </p:spTree>
     <p:extLst>
       <p:ext uri="{BB962C8B-B14F-4D97-AF65-F5344CB8AC3E}">
-        <p14:creationId xmlns:p14="http://schemas.microsoft.com/office/powerpoint/2010/main" val="2309861944"/>
+        <p14:creationId xmlns:p14="http://schemas.microsoft.com/office/powerpoint/2010/main" val="2396375544"/>
       </p:ext>
     </p:extLst>
   </p:cSld>
@@ -2176,13 +1905,7 @@
       </p:grpSpPr>
       <p:sp>
         <p:nvSpPr>
-          <p:cNvPr id="2" name="Title 1">
-            <a:extLst>
-              <a:ext uri="{FF2B5EF4-FFF2-40B4-BE49-F238E27FC236}">
-                <a16:creationId xmlns:a16="http://schemas.microsoft.com/office/drawing/2014/main" id="{F45D6F0C-9B15-31BD-7D79-74C94FBB63B7}"/>
-              </a:ext>
-            </a:extLst>
-          </p:cNvPr>
+          <p:cNvPr id="2" name="Title 1"/>
           <p:cNvSpPr>
             <a:spLocks noGrp="1"/>
           </p:cNvSpPr>
@@ -2208,19 +1931,13 @@
               <a:rPr lang="en-US"/>
               <a:t>Click to edit Master title style</a:t>
             </a:r>
-            <a:endParaRPr lang="en-AU"/>
-          </a:p>
-        </p:txBody>
-      </p:sp>
-      <p:sp>
-        <p:nvSpPr>
-          <p:cNvPr id="3" name="Content Placeholder 2">
-            <a:extLst>
-              <a:ext uri="{FF2B5EF4-FFF2-40B4-BE49-F238E27FC236}">
-                <a16:creationId xmlns:a16="http://schemas.microsoft.com/office/drawing/2014/main" id="{53E78EDF-C6A4-460F-9174-24D8E237F93C}"/>
-              </a:ext>
-            </a:extLst>
-          </p:cNvPr>
+            <a:endParaRPr lang="en-US" dirty="0"/>
+          </a:p>
+        </p:txBody>
+      </p:sp>
+      <p:sp>
+        <p:nvSpPr>
+          <p:cNvPr id="3" name="Content Placeholder 2"/>
           <p:cNvSpPr>
             <a:spLocks noGrp="1"/>
           </p:cNvSpPr>
@@ -2299,19 +2016,13 @@
               <a:rPr lang="en-US"/>
               <a:t>Fifth level</a:t>
             </a:r>
-            <a:endParaRPr lang="en-AU"/>
-          </a:p>
-        </p:txBody>
-      </p:sp>
-      <p:sp>
-        <p:nvSpPr>
-          <p:cNvPr id="4" name="Text Placeholder 3">
-            <a:extLst>
-              <a:ext uri="{FF2B5EF4-FFF2-40B4-BE49-F238E27FC236}">
-                <a16:creationId xmlns:a16="http://schemas.microsoft.com/office/drawing/2014/main" id="{3115608E-D9D6-1B92-F33C-217891D21530}"/>
-              </a:ext>
-            </a:extLst>
-          </p:cNvPr>
+            <a:endParaRPr lang="en-US" dirty="0"/>
+          </a:p>
+        </p:txBody>
+      </p:sp>
+      <p:sp>
+        <p:nvSpPr>
+          <p:cNvPr id="4" name="Text Placeholder 3"/>
           <p:cNvSpPr>
             <a:spLocks noGrp="1"/>
           </p:cNvSpPr>
@@ -2376,13 +2087,7 @@
       </p:sp>
       <p:sp>
         <p:nvSpPr>
-          <p:cNvPr id="5" name="Date Placeholder 4">
-            <a:extLst>
-              <a:ext uri="{FF2B5EF4-FFF2-40B4-BE49-F238E27FC236}">
-                <a16:creationId xmlns:a16="http://schemas.microsoft.com/office/drawing/2014/main" id="{609FF668-27A3-9273-B2CF-CF0FAE0C8AAF}"/>
-              </a:ext>
-            </a:extLst>
-          </p:cNvPr>
+          <p:cNvPr id="5" name="Date Placeholder 4"/>
           <p:cNvSpPr>
             <a:spLocks noGrp="1"/>
           </p:cNvSpPr>
@@ -2397,7 +2102,7 @@
           <a:p>
             <a:fld id="{05B95601-3CBB-4432-A9C1-49C0EA748C1C}" type="datetimeFigureOut">
               <a:rPr lang="en-AU" smtClean="0"/>
-              <a:t>24/08/2023</a:t>
+              <a:t>28/08/2023</a:t>
             </a:fld>
             <a:endParaRPr lang="en-AU"/>
           </a:p>
@@ -2405,13 +2110,7 @@
       </p:sp>
       <p:sp>
         <p:nvSpPr>
-          <p:cNvPr id="6" name="Footer Placeholder 5">
-            <a:extLst>
-              <a:ext uri="{FF2B5EF4-FFF2-40B4-BE49-F238E27FC236}">
-                <a16:creationId xmlns:a16="http://schemas.microsoft.com/office/drawing/2014/main" id="{F698EFD1-6EAD-F63C-4232-AC728B96A815}"/>
-              </a:ext>
-            </a:extLst>
-          </p:cNvPr>
+          <p:cNvPr id="6" name="Footer Placeholder 5"/>
           <p:cNvSpPr>
             <a:spLocks noGrp="1"/>
           </p:cNvSpPr>
@@ -2430,13 +2129,7 @@
       </p:sp>
       <p:sp>
         <p:nvSpPr>
-          <p:cNvPr id="7" name="Slide Number Placeholder 6">
-            <a:extLst>
-              <a:ext uri="{FF2B5EF4-FFF2-40B4-BE49-F238E27FC236}">
-                <a16:creationId xmlns:a16="http://schemas.microsoft.com/office/drawing/2014/main" id="{96AC3F42-E6E3-62C6-63EF-1A56C230142E}"/>
-              </a:ext>
-            </a:extLst>
-          </p:cNvPr>
+          <p:cNvPr id="7" name="Slide Number Placeholder 6"/>
           <p:cNvSpPr>
             <a:spLocks noGrp="1"/>
           </p:cNvSpPr>
@@ -2460,7 +2153,7 @@
     </p:spTree>
     <p:extLst>
       <p:ext uri="{BB962C8B-B14F-4D97-AF65-F5344CB8AC3E}">
-        <p14:creationId xmlns:p14="http://schemas.microsoft.com/office/powerpoint/2010/main" val="2012597775"/>
+        <p14:creationId xmlns:p14="http://schemas.microsoft.com/office/powerpoint/2010/main" val="2028971792"/>
       </p:ext>
     </p:extLst>
   </p:cSld>
@@ -2489,13 +2182,7 @@
       </p:grpSpPr>
       <p:sp>
         <p:nvSpPr>
-          <p:cNvPr id="2" name="Title 1">
-            <a:extLst>
-              <a:ext uri="{FF2B5EF4-FFF2-40B4-BE49-F238E27FC236}">
-                <a16:creationId xmlns:a16="http://schemas.microsoft.com/office/drawing/2014/main" id="{A7895E25-FC99-55E7-2192-F6FC4438C6ED}"/>
-              </a:ext>
-            </a:extLst>
-          </p:cNvPr>
+          <p:cNvPr id="2" name="Title 1"/>
           <p:cNvSpPr>
             <a:spLocks noGrp="1"/>
           </p:cNvSpPr>
@@ -2521,21 +2208,15 @@
               <a:rPr lang="en-US"/>
               <a:t>Click to edit Master title style</a:t>
             </a:r>
-            <a:endParaRPr lang="en-AU"/>
-          </a:p>
-        </p:txBody>
-      </p:sp>
-      <p:sp>
-        <p:nvSpPr>
-          <p:cNvPr id="3" name="Picture Placeholder 2">
-            <a:extLst>
-              <a:ext uri="{FF2B5EF4-FFF2-40B4-BE49-F238E27FC236}">
-                <a16:creationId xmlns:a16="http://schemas.microsoft.com/office/drawing/2014/main" id="{9672988D-1CA5-9E4C-EC9A-0972BA34A72F}"/>
-              </a:ext>
-            </a:extLst>
-          </p:cNvPr>
-          <p:cNvSpPr>
-            <a:spLocks noGrp="1"/>
+            <a:endParaRPr lang="en-US" dirty="0"/>
+          </a:p>
+        </p:txBody>
+      </p:sp>
+      <p:sp>
+        <p:nvSpPr>
+          <p:cNvPr id="3" name="Picture Placeholder 2"/>
+          <p:cNvSpPr>
+            <a:spLocks noGrp="1" noChangeAspect="1"/>
           </p:cNvSpPr>
           <p:nvPr>
             <p:ph type="pic" idx="1"/>
@@ -2548,7 +2229,7 @@
           </a:xfrm>
         </p:spPr>
         <p:txBody>
-          <a:bodyPr/>
+          <a:bodyPr anchor="t"/>
           <a:lstStyle>
             <a:lvl1pPr marL="0" indent="0">
               <a:buNone/>
@@ -2588,19 +2269,17 @@
             </a:lvl9pPr>
           </a:lstStyle>
           <a:p>
-            <a:endParaRPr lang="en-AU"/>
-          </a:p>
-        </p:txBody>
-      </p:sp>
-      <p:sp>
-        <p:nvSpPr>
-          <p:cNvPr id="4" name="Text Placeholder 3">
-            <a:extLst>
-              <a:ext uri="{FF2B5EF4-FFF2-40B4-BE49-F238E27FC236}">
-                <a16:creationId xmlns:a16="http://schemas.microsoft.com/office/drawing/2014/main" id="{88AB6767-4768-1282-697F-BDA9BD83EF87}"/>
-              </a:ext>
-            </a:extLst>
-          </p:cNvPr>
+            <a:r>
+              <a:rPr lang="en-US"/>
+              <a:t>Click icon to add picture</a:t>
+            </a:r>
+            <a:endParaRPr lang="en-US" dirty="0"/>
+          </a:p>
+        </p:txBody>
+      </p:sp>
+      <p:sp>
+        <p:nvSpPr>
+          <p:cNvPr id="4" name="Text Placeholder 3"/>
           <p:cNvSpPr>
             <a:spLocks noGrp="1"/>
           </p:cNvSpPr>
@@ -2665,13 +2344,7 @@
       </p:sp>
       <p:sp>
         <p:nvSpPr>
-          <p:cNvPr id="5" name="Date Placeholder 4">
-            <a:extLst>
-              <a:ext uri="{FF2B5EF4-FFF2-40B4-BE49-F238E27FC236}">
-                <a16:creationId xmlns:a16="http://schemas.microsoft.com/office/drawing/2014/main" id="{CC8A2774-F3CE-6C82-9DF8-67BA20DF591A}"/>
-              </a:ext>
-            </a:extLst>
-          </p:cNvPr>
+          <p:cNvPr id="5" name="Date Placeholder 4"/>
           <p:cNvSpPr>
             <a:spLocks noGrp="1"/>
           </p:cNvSpPr>
@@ -2686,7 +2359,7 @@
           <a:p>
             <a:fld id="{05B95601-3CBB-4432-A9C1-49C0EA748C1C}" type="datetimeFigureOut">
               <a:rPr lang="en-AU" smtClean="0"/>
-              <a:t>24/08/2023</a:t>
+              <a:t>28/08/2023</a:t>
             </a:fld>
             <a:endParaRPr lang="en-AU"/>
           </a:p>
@@ -2694,13 +2367,7 @@
       </p:sp>
       <p:sp>
         <p:nvSpPr>
-          <p:cNvPr id="6" name="Footer Placeholder 5">
-            <a:extLst>
-              <a:ext uri="{FF2B5EF4-FFF2-40B4-BE49-F238E27FC236}">
-                <a16:creationId xmlns:a16="http://schemas.microsoft.com/office/drawing/2014/main" id="{07B5F2EA-6D83-5117-A94D-F4F87B801A9B}"/>
-              </a:ext>
-            </a:extLst>
-          </p:cNvPr>
+          <p:cNvPr id="6" name="Footer Placeholder 5"/>
           <p:cNvSpPr>
             <a:spLocks noGrp="1"/>
           </p:cNvSpPr>
@@ -2719,13 +2386,7 @@
       </p:sp>
       <p:sp>
         <p:nvSpPr>
-          <p:cNvPr id="7" name="Slide Number Placeholder 6">
-            <a:extLst>
-              <a:ext uri="{FF2B5EF4-FFF2-40B4-BE49-F238E27FC236}">
-                <a16:creationId xmlns:a16="http://schemas.microsoft.com/office/drawing/2014/main" id="{EDE6E66E-966D-200F-AB03-BF61D3CFA9BA}"/>
-              </a:ext>
-            </a:extLst>
-          </p:cNvPr>
+          <p:cNvPr id="7" name="Slide Number Placeholder 6"/>
           <p:cNvSpPr>
             <a:spLocks noGrp="1"/>
           </p:cNvSpPr>
@@ -2749,7 +2410,7 @@
     </p:spTree>
     <p:extLst>
       <p:ext uri="{BB962C8B-B14F-4D97-AF65-F5344CB8AC3E}">
-        <p14:creationId xmlns:p14="http://schemas.microsoft.com/office/powerpoint/2010/main" val="2109533334"/>
+        <p14:creationId xmlns:p14="http://schemas.microsoft.com/office/powerpoint/2010/main" val="1188008335"/>
       </p:ext>
     </p:extLst>
   </p:cSld>
@@ -2783,13 +2444,7 @@
       </p:grpSpPr>
       <p:sp>
         <p:nvSpPr>
-          <p:cNvPr id="2" name="Title Placeholder 1">
-            <a:extLst>
-              <a:ext uri="{FF2B5EF4-FFF2-40B4-BE49-F238E27FC236}">
-                <a16:creationId xmlns:a16="http://schemas.microsoft.com/office/drawing/2014/main" id="{900367D9-6BB2-8453-8F46-EDCF8336C69D}"/>
-              </a:ext>
-            </a:extLst>
-          </p:cNvPr>
+          <p:cNvPr id="2" name="Title Placeholder 1"/>
           <p:cNvSpPr>
             <a:spLocks noGrp="1"/>
           </p:cNvSpPr>
@@ -2816,19 +2471,13 @@
               <a:rPr lang="en-US"/>
               <a:t>Click to edit Master title style</a:t>
             </a:r>
-            <a:endParaRPr lang="en-AU"/>
-          </a:p>
-        </p:txBody>
-      </p:sp>
-      <p:sp>
-        <p:nvSpPr>
-          <p:cNvPr id="3" name="Text Placeholder 2">
-            <a:extLst>
-              <a:ext uri="{FF2B5EF4-FFF2-40B4-BE49-F238E27FC236}">
-                <a16:creationId xmlns:a16="http://schemas.microsoft.com/office/drawing/2014/main" id="{B379E8C0-6657-26CA-5C75-72E2A4919E12}"/>
-              </a:ext>
-            </a:extLst>
-          </p:cNvPr>
+            <a:endParaRPr lang="en-US" dirty="0"/>
+          </a:p>
+        </p:txBody>
+      </p:sp>
+      <p:sp>
+        <p:nvSpPr>
+          <p:cNvPr id="3" name="Text Placeholder 2"/>
           <p:cNvSpPr>
             <a:spLocks noGrp="1"/>
           </p:cNvSpPr>
@@ -2884,19 +2533,13 @@
               <a:rPr lang="en-US"/>
               <a:t>Fifth level</a:t>
             </a:r>
-            <a:endParaRPr lang="en-AU"/>
-          </a:p>
-        </p:txBody>
-      </p:sp>
-      <p:sp>
-        <p:nvSpPr>
-          <p:cNvPr id="4" name="Date Placeholder 3">
-            <a:extLst>
-              <a:ext uri="{FF2B5EF4-FFF2-40B4-BE49-F238E27FC236}">
-                <a16:creationId xmlns:a16="http://schemas.microsoft.com/office/drawing/2014/main" id="{4DCEE1C7-A2FB-80D7-DDD6-770E2AADBFB4}"/>
-              </a:ext>
-            </a:extLst>
-          </p:cNvPr>
+            <a:endParaRPr lang="en-US" dirty="0"/>
+          </a:p>
+        </p:txBody>
+      </p:sp>
+      <p:sp>
+        <p:nvSpPr>
+          <p:cNvPr id="4" name="Date Placeholder 3"/>
           <p:cNvSpPr>
             <a:spLocks noGrp="1"/>
           </p:cNvSpPr>
@@ -2929,7 +2572,7 @@
           <a:p>
             <a:fld id="{05B95601-3CBB-4432-A9C1-49C0EA748C1C}" type="datetimeFigureOut">
               <a:rPr lang="en-AU" smtClean="0"/>
-              <a:t>24/08/2023</a:t>
+              <a:t>28/08/2023</a:t>
             </a:fld>
             <a:endParaRPr lang="en-AU"/>
           </a:p>
@@ -2937,13 +2580,7 @@
       </p:sp>
       <p:sp>
         <p:nvSpPr>
-          <p:cNvPr id="5" name="Footer Placeholder 4">
-            <a:extLst>
-              <a:ext uri="{FF2B5EF4-FFF2-40B4-BE49-F238E27FC236}">
-                <a16:creationId xmlns:a16="http://schemas.microsoft.com/office/drawing/2014/main" id="{0B5C1690-ADB8-7A18-BBE9-E4B67F504223}"/>
-              </a:ext>
-            </a:extLst>
-          </p:cNvPr>
+          <p:cNvPr id="5" name="Footer Placeholder 4"/>
           <p:cNvSpPr>
             <a:spLocks noGrp="1"/>
           </p:cNvSpPr>
@@ -2980,13 +2617,7 @@
       </p:sp>
       <p:sp>
         <p:nvSpPr>
-          <p:cNvPr id="6" name="Slide Number Placeholder 5">
-            <a:extLst>
-              <a:ext uri="{FF2B5EF4-FFF2-40B4-BE49-F238E27FC236}">
-                <a16:creationId xmlns:a16="http://schemas.microsoft.com/office/drawing/2014/main" id="{598AF98B-CB7C-F0DB-F031-E9673E0D1941}"/>
-              </a:ext>
-            </a:extLst>
-          </p:cNvPr>
+          <p:cNvPr id="6" name="Slide Number Placeholder 5"/>
           <p:cNvSpPr>
             <a:spLocks noGrp="1"/>
           </p:cNvSpPr>
@@ -3028,23 +2659,23 @@
     </p:spTree>
     <p:extLst>
       <p:ext uri="{BB962C8B-B14F-4D97-AF65-F5344CB8AC3E}">
-        <p14:creationId xmlns:p14="http://schemas.microsoft.com/office/powerpoint/2010/main" val="1906536326"/>
+        <p14:creationId xmlns:p14="http://schemas.microsoft.com/office/powerpoint/2010/main" val="97736751"/>
       </p:ext>
     </p:extLst>
   </p:cSld>
-  <p:clrMap bg1="lt1" tx1="dk1" bg2="lt2" tx2="dk2" accent1="accent1" accent2="accent2" accent3="accent3" accent4="accent4" accent5="accent5" accent6="accent6" hlink="hlink" folHlink="folHlink"/>
+  <p:clrMap bg1="dk1" tx1="lt1" bg2="dk2" tx2="lt2" accent1="accent1" accent2="accent2" accent3="accent3" accent4="accent4" accent5="accent5" accent6="accent6" hlink="hlink" folHlink="folHlink"/>
   <p:sldLayoutIdLst>
-    <p:sldLayoutId id="2147483649" r:id="rId1"/>
-    <p:sldLayoutId id="2147483650" r:id="rId2"/>
-    <p:sldLayoutId id="2147483651" r:id="rId3"/>
-    <p:sldLayoutId id="2147483652" r:id="rId4"/>
-    <p:sldLayoutId id="2147483653" r:id="rId5"/>
-    <p:sldLayoutId id="2147483654" r:id="rId6"/>
-    <p:sldLayoutId id="2147483655" r:id="rId7"/>
-    <p:sldLayoutId id="2147483656" r:id="rId8"/>
-    <p:sldLayoutId id="2147483657" r:id="rId9"/>
-    <p:sldLayoutId id="2147483658" r:id="rId10"/>
-    <p:sldLayoutId id="2147483659" r:id="rId11"/>
+    <p:sldLayoutId id="2147483661" r:id="rId1"/>
+    <p:sldLayoutId id="2147483662" r:id="rId2"/>
+    <p:sldLayoutId id="2147483663" r:id="rId3"/>
+    <p:sldLayoutId id="2147483664" r:id="rId4"/>
+    <p:sldLayoutId id="2147483665" r:id="rId5"/>
+    <p:sldLayoutId id="2147483666" r:id="rId6"/>
+    <p:sldLayoutId id="2147483667" r:id="rId7"/>
+    <p:sldLayoutId id="2147483668" r:id="rId8"/>
+    <p:sldLayoutId id="2147483669" r:id="rId9"/>
+    <p:sldLayoutId id="2147483670" r:id="rId10"/>
+    <p:sldLayoutId id="2147483671" r:id="rId11"/>
   </p:sldLayoutIdLst>
   <p:txStyles>
     <p:titleStyle>
@@ -3438,7 +3069,7 @@
           <p:cNvPr id="2" name="Title 1">
             <a:extLst>
               <a:ext uri="{FF2B5EF4-FFF2-40B4-BE49-F238E27FC236}">
-                <a16:creationId xmlns:a16="http://schemas.microsoft.com/office/drawing/2014/main" id="{4BFF4E43-ED38-AA82-A47A-FDDA4F871D16}"/>
+                <a16:creationId xmlns:a16="http://schemas.microsoft.com/office/drawing/2014/main" id="{8F335437-A046-C200-A9FD-F1B99ECF9D48}"/>
               </a:ext>
             </a:extLst>
           </p:cNvPr>
@@ -3456,80 +3087,1228 @@
           <a:p>
             <a:r>
               <a:rPr lang="en-AU" dirty="0"/>
-              <a:t>Application Security</a:t>
-            </a:r>
-          </a:p>
-        </p:txBody>
-      </p:sp>
-      <p:sp>
-        <p:nvSpPr>
-          <p:cNvPr id="3" name="Content Placeholder 2">
+              <a:t>App diagram</a:t>
+            </a:r>
+          </a:p>
+        </p:txBody>
+      </p:sp>
+      <p:pic>
+        <p:nvPicPr>
+          <p:cNvPr id="1028" name="Picture 4" descr="Application - Free professions and jobs icons">
             <a:extLst>
               <a:ext uri="{FF2B5EF4-FFF2-40B4-BE49-F238E27FC236}">
-                <a16:creationId xmlns:a16="http://schemas.microsoft.com/office/drawing/2014/main" id="{EE3A9785-06E5-EEF3-119D-01DAAED8C69A}"/>
+                <a16:creationId xmlns:a16="http://schemas.microsoft.com/office/drawing/2014/main" id="{961CC548-D3A2-851B-E91C-CCB07DFA9CAD}"/>
               </a:ext>
             </a:extLst>
           </p:cNvPr>
-          <p:cNvSpPr>
-            <a:spLocks noGrp="1"/>
-          </p:cNvSpPr>
-          <p:nvPr>
-            <p:ph idx="1"/>
-          </p:nvPr>
-        </p:nvSpPr>
-        <p:spPr/>
-        <p:txBody>
-          <a:bodyPr/>
-          <a:lstStyle/>
-          <a:p>
-            <a:pPr marL="0" indent="0">
-              <a:buNone/>
-            </a:pPr>
+          <p:cNvPicPr>
+            <a:picLocks noChangeAspect="1" noChangeArrowheads="1"/>
+          </p:cNvPicPr>
+          <p:nvPr/>
+        </p:nvPicPr>
+        <p:blipFill>
+          <a:blip r:embed="rId2">
+            <a:extLst>
+              <a:ext uri="{28A0092B-C50C-407E-A947-70E740481C1C}">
+                <a14:useLocalDpi xmlns:a14="http://schemas.microsoft.com/office/drawing/2010/main" val="0"/>
+              </a:ext>
+            </a:extLst>
+          </a:blip>
+          <a:srcRect/>
+          <a:stretch>
+            <a:fillRect/>
+          </a:stretch>
+        </p:blipFill>
+        <p:spPr bwMode="auto">
+          <a:xfrm>
+            <a:off x="1299008" y="2225610"/>
+            <a:ext cx="682417" cy="682417"/>
+          </a:xfrm>
+          <a:prstGeom prst="rect">
+            <a:avLst/>
+          </a:prstGeom>
+          <a:noFill/>
+          <a:extLst>
+            <a:ext uri="{909E8E84-426E-40DD-AFC4-6F175D3DCCD1}">
+              <a14:hiddenFill xmlns:a14="http://schemas.microsoft.com/office/drawing/2010/main">
+                <a:solidFill>
+                  <a:srgbClr val="FFFFFF"/>
+                </a:solidFill>
+              </a14:hiddenFill>
+            </a:ext>
+          </a:extLst>
+        </p:spPr>
+      </p:pic>
+      <p:pic>
+        <p:nvPicPr>
+          <p:cNvPr id="1030" name="Picture 6" descr="Exploring Containers: Creating a Dockerfile | TechWell">
+            <a:extLst>
+              <a:ext uri="{FF2B5EF4-FFF2-40B4-BE49-F238E27FC236}">
+                <a16:creationId xmlns:a16="http://schemas.microsoft.com/office/drawing/2014/main" id="{F5E69E26-70F2-77BB-5E58-D9356EC0BAC9}"/>
+              </a:ext>
+            </a:extLst>
+          </p:cNvPr>
+          <p:cNvPicPr>
+            <a:picLocks noChangeAspect="1" noChangeArrowheads="1"/>
+          </p:cNvPicPr>
+          <p:nvPr/>
+        </p:nvPicPr>
+        <p:blipFill>
+          <a:blip r:embed="rId3">
+            <a:extLst>
+              <a:ext uri="{28A0092B-C50C-407E-A947-70E740481C1C}">
+                <a14:useLocalDpi xmlns:a14="http://schemas.microsoft.com/office/drawing/2010/main" val="0"/>
+              </a:ext>
+            </a:extLst>
+          </a:blip>
+          <a:srcRect/>
+          <a:stretch>
+            <a:fillRect/>
+          </a:stretch>
+        </p:blipFill>
+        <p:spPr bwMode="auto">
+          <a:xfrm>
+            <a:off x="2662779" y="2249283"/>
+            <a:ext cx="706463" cy="706463"/>
+          </a:xfrm>
+          <a:prstGeom prst="rect">
+            <a:avLst/>
+          </a:prstGeom>
+          <a:noFill/>
+          <a:extLst>
+            <a:ext uri="{909E8E84-426E-40DD-AFC4-6F175D3DCCD1}">
+              <a14:hiddenFill xmlns:a14="http://schemas.microsoft.com/office/drawing/2010/main">
+                <a:solidFill>
+                  <a:srgbClr val="FFFFFF"/>
+                </a:solidFill>
+              </a14:hiddenFill>
+            </a:ext>
+          </a:extLst>
+        </p:spPr>
+      </p:pic>
+      <p:pic>
+        <p:nvPicPr>
+          <p:cNvPr id="1032" name="Picture 8" descr="Container Registry | Microsoft Azure Mono">
+            <a:extLst>
+              <a:ext uri="{FF2B5EF4-FFF2-40B4-BE49-F238E27FC236}">
+                <a16:creationId xmlns:a16="http://schemas.microsoft.com/office/drawing/2014/main" id="{80C70C51-4544-1518-B3B3-BA103DEF7D8D}"/>
+              </a:ext>
+            </a:extLst>
+          </p:cNvPr>
+          <p:cNvPicPr>
+            <a:picLocks noChangeAspect="1" noChangeArrowheads="1"/>
+          </p:cNvPicPr>
+          <p:nvPr/>
+        </p:nvPicPr>
+        <p:blipFill>
+          <a:blip r:embed="rId4">
+            <a:extLst>
+              <a:ext uri="{28A0092B-C50C-407E-A947-70E740481C1C}">
+                <a14:useLocalDpi xmlns:a14="http://schemas.microsoft.com/office/drawing/2010/main" val="0"/>
+              </a:ext>
+            </a:extLst>
+          </a:blip>
+          <a:srcRect/>
+          <a:stretch>
+            <a:fillRect/>
+          </a:stretch>
+        </p:blipFill>
+        <p:spPr bwMode="auto">
+          <a:xfrm>
+            <a:off x="5630136" y="2089583"/>
+            <a:ext cx="987654" cy="879759"/>
+          </a:xfrm>
+          <a:prstGeom prst="rect">
+            <a:avLst/>
+          </a:prstGeom>
+          <a:noFill/>
+          <a:extLst>
+            <a:ext uri="{909E8E84-426E-40DD-AFC4-6F175D3DCCD1}">
+              <a14:hiddenFill xmlns:a14="http://schemas.microsoft.com/office/drawing/2010/main">
+                <a:solidFill>
+                  <a:srgbClr val="FFFFFF"/>
+                </a:solidFill>
+              </a14:hiddenFill>
+            </a:ext>
+          </a:extLst>
+        </p:spPr>
+      </p:pic>
+      <p:pic>
+        <p:nvPicPr>
+          <p:cNvPr id="1034" name="Picture 10" descr="Infrastructure-as-code blue gradient concept icon. Cyber technology  providing. Tech macro trends abstract idea thin line illustration. Isolated  outline drawing. 8741544 Vector Art at Vecteezy">
+            <a:extLst>
+              <a:ext uri="{FF2B5EF4-FFF2-40B4-BE49-F238E27FC236}">
+                <a16:creationId xmlns:a16="http://schemas.microsoft.com/office/drawing/2014/main" id="{231282AE-CC6E-3CAF-8F8D-89420BF9C9BB}"/>
+              </a:ext>
+            </a:extLst>
+          </p:cNvPr>
+          <p:cNvPicPr>
+            <a:picLocks noChangeAspect="1" noChangeArrowheads="1"/>
+          </p:cNvPicPr>
+          <p:nvPr/>
+        </p:nvPicPr>
+        <p:blipFill>
+          <a:blip r:embed="rId5">
+            <a:extLst>
+              <a:ext uri="{28A0092B-C50C-407E-A947-70E740481C1C}">
+                <a14:useLocalDpi xmlns:a14="http://schemas.microsoft.com/office/drawing/2010/main" val="0"/>
+              </a:ext>
+            </a:extLst>
+          </a:blip>
+          <a:srcRect/>
+          <a:stretch>
+            <a:fillRect/>
+          </a:stretch>
+        </p:blipFill>
+        <p:spPr bwMode="auto">
+          <a:xfrm>
+            <a:off x="1171323" y="4688603"/>
+            <a:ext cx="952500" cy="952500"/>
+          </a:xfrm>
+          <a:prstGeom prst="rect">
+            <a:avLst/>
+          </a:prstGeom>
+          <a:noFill/>
+          <a:extLst>
+            <a:ext uri="{909E8E84-426E-40DD-AFC4-6F175D3DCCD1}">
+              <a14:hiddenFill xmlns:a14="http://schemas.microsoft.com/office/drawing/2010/main">
+                <a:solidFill>
+                  <a:srgbClr val="FFFFFF"/>
+                </a:solidFill>
+              </a14:hiddenFill>
+            </a:ext>
+          </a:extLst>
+        </p:spPr>
+      </p:pic>
+      <p:cxnSp>
+        <p:nvCxnSpPr>
+          <p:cNvPr id="6" name="Straight Arrow Connector 5">
+            <a:extLst>
+              <a:ext uri="{FF2B5EF4-FFF2-40B4-BE49-F238E27FC236}">
+                <a16:creationId xmlns:a16="http://schemas.microsoft.com/office/drawing/2014/main" id="{46A3A875-E39F-9E07-C923-E6383A1F3D8B}"/>
+              </a:ext>
+            </a:extLst>
+          </p:cNvPr>
+          <p:cNvCxnSpPr>
+            <a:stCxn id="1028" idx="3"/>
+            <a:endCxn id="1032" idx="1"/>
+          </p:cNvCxnSpPr>
+          <p:nvPr/>
+        </p:nvCxnSpPr>
+        <p:spPr>
+          <a:xfrm flipV="1">
+            <a:off x="1981425" y="2529463"/>
+            <a:ext cx="3648711" cy="37356"/>
+          </a:xfrm>
+          <a:prstGeom prst="straightConnector1">
+            <a:avLst/>
+          </a:prstGeom>
+          <a:ln>
+            <a:tailEnd type="triangle"/>
+          </a:ln>
+        </p:spPr>
+        <p:style>
+          <a:lnRef idx="1">
+            <a:schemeClr val="accent1"/>
+          </a:lnRef>
+          <a:fillRef idx="0">
+            <a:schemeClr val="accent1"/>
+          </a:fillRef>
+          <a:effectRef idx="0">
+            <a:schemeClr val="accent1"/>
+          </a:effectRef>
+          <a:fontRef idx="minor">
+            <a:schemeClr val="tx1"/>
+          </a:fontRef>
+        </p:style>
+      </p:cxnSp>
+      <p:sp>
+        <p:nvSpPr>
+          <p:cNvPr id="7" name="TextBox 6">
+            <a:extLst>
+              <a:ext uri="{FF2B5EF4-FFF2-40B4-BE49-F238E27FC236}">
+                <a16:creationId xmlns:a16="http://schemas.microsoft.com/office/drawing/2014/main" id="{578BAD64-356E-ADB7-BE9E-16B6DEB90FD0}"/>
+              </a:ext>
+            </a:extLst>
+          </p:cNvPr>
+          <p:cNvSpPr txBox="1"/>
+          <p:nvPr/>
+        </p:nvSpPr>
+        <p:spPr>
+          <a:xfrm>
+            <a:off x="1055635" y="3065490"/>
+            <a:ext cx="1288838" cy="646331"/>
+          </a:xfrm>
+          <a:prstGeom prst="rect">
+            <a:avLst/>
+          </a:prstGeom>
+          <a:noFill/>
+        </p:spPr>
+        <p:txBody>
+          <a:bodyPr wrap="square" rtlCol="0">
+            <a:spAutoFit/>
+          </a:bodyPr>
+          <a:lstStyle/>
+          <a:p>
             <a:r>
               <a:rPr lang="en-AU" dirty="0"/>
-              <a:t>Encryption</a:t>
-            </a:r>
-          </a:p>
+              <a:t>Application backend</a:t>
+            </a:r>
+          </a:p>
+        </p:txBody>
+      </p:sp>
+      <p:sp>
+        <p:nvSpPr>
+          <p:cNvPr id="8" name="TextBox 7">
+            <a:extLst>
+              <a:ext uri="{FF2B5EF4-FFF2-40B4-BE49-F238E27FC236}">
+                <a16:creationId xmlns:a16="http://schemas.microsoft.com/office/drawing/2014/main" id="{3C2A432D-0671-D0D3-2C01-717F14F42080}"/>
+              </a:ext>
+            </a:extLst>
+          </p:cNvPr>
+          <p:cNvSpPr txBox="1"/>
+          <p:nvPr/>
+        </p:nvSpPr>
+        <p:spPr>
+          <a:xfrm>
+            <a:off x="5294975" y="3018057"/>
+            <a:ext cx="1905522" cy="369332"/>
+          </a:xfrm>
+          <a:prstGeom prst="rect">
+            <a:avLst/>
+          </a:prstGeom>
+          <a:noFill/>
+        </p:spPr>
+        <p:txBody>
+          <a:bodyPr wrap="none" rtlCol="0">
+            <a:spAutoFit/>
+          </a:bodyPr>
+          <a:lstStyle/>
           <a:p>
             <a:r>
               <a:rPr lang="en-AU" dirty="0"/>
-              <a:t>Transit</a:t>
-            </a:r>
-          </a:p>
+              <a:t>Container Registry</a:t>
+            </a:r>
+          </a:p>
+        </p:txBody>
+      </p:sp>
+      <p:sp>
+        <p:nvSpPr>
+          <p:cNvPr id="9" name="TextBox 8">
+            <a:extLst>
+              <a:ext uri="{FF2B5EF4-FFF2-40B4-BE49-F238E27FC236}">
+                <a16:creationId xmlns:a16="http://schemas.microsoft.com/office/drawing/2014/main" id="{6CD4AB82-BAEB-1DDA-1441-D8D0B7F716F9}"/>
+              </a:ext>
+            </a:extLst>
+          </p:cNvPr>
+          <p:cNvSpPr txBox="1"/>
+          <p:nvPr/>
+        </p:nvSpPr>
+        <p:spPr>
+          <a:xfrm>
+            <a:off x="5291718" y="5835764"/>
+            <a:ext cx="1905522" cy="646331"/>
+          </a:xfrm>
+          <a:prstGeom prst="rect">
+            <a:avLst/>
+          </a:prstGeom>
+          <a:noFill/>
+        </p:spPr>
+        <p:txBody>
+          <a:bodyPr wrap="square" rtlCol="0">
+            <a:spAutoFit/>
+          </a:bodyPr>
+          <a:lstStyle/>
           <a:p>
             <a:r>
               <a:rPr lang="en-AU" dirty="0"/>
-              <a:t>Rest</a:t>
-            </a:r>
-          </a:p>
-          <a:p>
+              <a:t>Cloud Kubernetes Infrastructure</a:t>
+            </a:r>
+          </a:p>
+        </p:txBody>
+      </p:sp>
+      <p:pic>
+        <p:nvPicPr>
+          <p:cNvPr id="1044" name="Picture 20" descr="Cloud - Free computer icons">
+            <a:extLst>
+              <a:ext uri="{FF2B5EF4-FFF2-40B4-BE49-F238E27FC236}">
+                <a16:creationId xmlns:a16="http://schemas.microsoft.com/office/drawing/2014/main" id="{71EE6A25-2B37-751C-88B2-A4245F5A46DD}"/>
+              </a:ext>
+            </a:extLst>
+          </p:cNvPr>
+          <p:cNvPicPr>
+            <a:picLocks noChangeAspect="1" noChangeArrowheads="1"/>
+          </p:cNvPicPr>
+          <p:nvPr/>
+        </p:nvPicPr>
+        <p:blipFill>
+          <a:blip r:embed="rId6">
+            <a:extLst>
+              <a:ext uri="{28A0092B-C50C-407E-A947-70E740481C1C}">
+                <a14:useLocalDpi xmlns:a14="http://schemas.microsoft.com/office/drawing/2010/main" val="0"/>
+              </a:ext>
+            </a:extLst>
+          </a:blip>
+          <a:srcRect/>
+          <a:stretch>
+            <a:fillRect/>
+          </a:stretch>
+        </p:blipFill>
+        <p:spPr bwMode="auto">
+          <a:xfrm>
+            <a:off x="5747049" y="4611260"/>
+            <a:ext cx="1007959" cy="1007959"/>
+          </a:xfrm>
+          <a:prstGeom prst="rect">
+            <a:avLst/>
+          </a:prstGeom>
+          <a:noFill/>
+          <a:extLst>
+            <a:ext uri="{909E8E84-426E-40DD-AFC4-6F175D3DCCD1}">
+              <a14:hiddenFill xmlns:a14="http://schemas.microsoft.com/office/drawing/2010/main">
+                <a:solidFill>
+                  <a:srgbClr val="FFFFFF"/>
+                </a:solidFill>
+              </a14:hiddenFill>
+            </a:ext>
+          </a:extLst>
+        </p:spPr>
+      </p:pic>
+      <p:cxnSp>
+        <p:nvCxnSpPr>
+          <p:cNvPr id="10" name="Straight Arrow Connector 9">
+            <a:extLst>
+              <a:ext uri="{FF2B5EF4-FFF2-40B4-BE49-F238E27FC236}">
+                <a16:creationId xmlns:a16="http://schemas.microsoft.com/office/drawing/2014/main" id="{F37590FB-EC0E-E7FD-8062-B9D0FD17CB0D}"/>
+              </a:ext>
+            </a:extLst>
+          </p:cNvPr>
+          <p:cNvCxnSpPr/>
+          <p:nvPr/>
+        </p:nvCxnSpPr>
+        <p:spPr>
+          <a:xfrm>
+            <a:off x="2123823" y="5152466"/>
+            <a:ext cx="3475740" cy="24773"/>
+          </a:xfrm>
+          <a:prstGeom prst="straightConnector1">
+            <a:avLst/>
+          </a:prstGeom>
+          <a:ln>
+            <a:tailEnd type="triangle"/>
+          </a:ln>
+        </p:spPr>
+        <p:style>
+          <a:lnRef idx="1">
+            <a:schemeClr val="accent1"/>
+          </a:lnRef>
+          <a:fillRef idx="0">
+            <a:schemeClr val="accent1"/>
+          </a:fillRef>
+          <a:effectRef idx="0">
+            <a:schemeClr val="accent1"/>
+          </a:effectRef>
+          <a:fontRef idx="minor">
+            <a:schemeClr val="tx1"/>
+          </a:fontRef>
+        </p:style>
+      </p:cxnSp>
+      <p:sp>
+        <p:nvSpPr>
+          <p:cNvPr id="11" name="TextBox 10">
+            <a:extLst>
+              <a:ext uri="{FF2B5EF4-FFF2-40B4-BE49-F238E27FC236}">
+                <a16:creationId xmlns:a16="http://schemas.microsoft.com/office/drawing/2014/main" id="{8C952DD0-B906-4B7F-A3F0-3B5117820DE1}"/>
+              </a:ext>
+            </a:extLst>
+          </p:cNvPr>
+          <p:cNvSpPr txBox="1"/>
+          <p:nvPr/>
+        </p:nvSpPr>
+        <p:spPr>
+          <a:xfrm>
+            <a:off x="722126" y="5785699"/>
+            <a:ext cx="2263312" cy="369332"/>
+          </a:xfrm>
+          <a:prstGeom prst="rect">
+            <a:avLst/>
+          </a:prstGeom>
+          <a:noFill/>
+        </p:spPr>
+        <p:txBody>
+          <a:bodyPr wrap="none" rtlCol="0">
+            <a:spAutoFit/>
+          </a:bodyPr>
+          <a:lstStyle/>
+          <a:p>
+            <a:r>
+              <a:rPr lang="en-AU" dirty="0"/>
+              <a:t>Infrastructure as Code</a:t>
+            </a:r>
+          </a:p>
+        </p:txBody>
+      </p:sp>
+      <p:pic>
+        <p:nvPicPr>
+          <p:cNvPr id="1046" name="Picture 22" descr="Azure DevOps Pipelines: Naming and Tagging | by Eric Anderson | ITNEXT">
+            <a:extLst>
+              <a:ext uri="{FF2B5EF4-FFF2-40B4-BE49-F238E27FC236}">
+                <a16:creationId xmlns:a16="http://schemas.microsoft.com/office/drawing/2014/main" id="{D330C77D-5E05-7EC8-6D61-4E184BA91D92}"/>
+              </a:ext>
+            </a:extLst>
+          </p:cNvPr>
+          <p:cNvPicPr>
+            <a:picLocks noChangeAspect="1" noChangeArrowheads="1"/>
+          </p:cNvPicPr>
+          <p:nvPr/>
+        </p:nvPicPr>
+        <p:blipFill>
+          <a:blip r:embed="rId7">
+            <a:extLst>
+              <a:ext uri="{28A0092B-C50C-407E-A947-70E740481C1C}">
+                <a14:useLocalDpi xmlns:a14="http://schemas.microsoft.com/office/drawing/2010/main" val="0"/>
+              </a:ext>
+            </a:extLst>
+          </a:blip>
+          <a:srcRect/>
+          <a:stretch>
+            <a:fillRect/>
+          </a:stretch>
+        </p:blipFill>
+        <p:spPr bwMode="auto">
+          <a:xfrm>
+            <a:off x="4096247" y="2262878"/>
+            <a:ext cx="706463" cy="706463"/>
+          </a:xfrm>
+          <a:prstGeom prst="rect">
+            <a:avLst/>
+          </a:prstGeom>
+          <a:noFill/>
+          <a:extLst>
+            <a:ext uri="{909E8E84-426E-40DD-AFC4-6F175D3DCCD1}">
+              <a14:hiddenFill xmlns:a14="http://schemas.microsoft.com/office/drawing/2010/main">
+                <a:solidFill>
+                  <a:srgbClr val="FFFFFF"/>
+                </a:solidFill>
+              </a14:hiddenFill>
+            </a:ext>
+          </a:extLst>
+        </p:spPr>
+      </p:pic>
+      <p:pic>
+        <p:nvPicPr>
+          <p:cNvPr id="12" name="Picture 22" descr="Azure DevOps Pipelines: Naming and Tagging | by Eric Anderson | ITNEXT">
+            <a:extLst>
+              <a:ext uri="{FF2B5EF4-FFF2-40B4-BE49-F238E27FC236}">
+                <a16:creationId xmlns:a16="http://schemas.microsoft.com/office/drawing/2014/main" id="{42688110-3A89-4431-D57D-ADCEA49C945F}"/>
+              </a:ext>
+            </a:extLst>
+          </p:cNvPr>
+          <p:cNvPicPr>
+            <a:picLocks noChangeAspect="1" noChangeArrowheads="1"/>
+          </p:cNvPicPr>
+          <p:nvPr/>
+        </p:nvPicPr>
+        <p:blipFill>
+          <a:blip r:embed="rId7">
+            <a:extLst>
+              <a:ext uri="{28A0092B-C50C-407E-A947-70E740481C1C}">
+                <a14:useLocalDpi xmlns:a14="http://schemas.microsoft.com/office/drawing/2010/main" val="0"/>
+              </a:ext>
+            </a:extLst>
+          </a:blip>
+          <a:srcRect/>
+          <a:stretch>
+            <a:fillRect/>
+          </a:stretch>
+        </p:blipFill>
+        <p:spPr bwMode="auto">
+          <a:xfrm>
+            <a:off x="3398911" y="4799234"/>
+            <a:ext cx="706463" cy="706463"/>
+          </a:xfrm>
+          <a:prstGeom prst="rect">
+            <a:avLst/>
+          </a:prstGeom>
+          <a:noFill/>
+          <a:extLst>
+            <a:ext uri="{909E8E84-426E-40DD-AFC4-6F175D3DCCD1}">
+              <a14:hiddenFill xmlns:a14="http://schemas.microsoft.com/office/drawing/2010/main">
+                <a:solidFill>
+                  <a:srgbClr val="FFFFFF"/>
+                </a:solidFill>
+              </a14:hiddenFill>
+            </a:ext>
+          </a:extLst>
+        </p:spPr>
+      </p:pic>
+      <p:cxnSp>
+        <p:nvCxnSpPr>
+          <p:cNvPr id="14" name="Straight Arrow Connector 13">
+            <a:extLst>
+              <a:ext uri="{FF2B5EF4-FFF2-40B4-BE49-F238E27FC236}">
+                <a16:creationId xmlns:a16="http://schemas.microsoft.com/office/drawing/2014/main" id="{EF031591-B29F-FAE8-29AC-E98DE64C4217}"/>
+              </a:ext>
+            </a:extLst>
+          </p:cNvPr>
+          <p:cNvCxnSpPr>
+            <a:cxnSpLocks/>
+            <a:stCxn id="8" idx="2"/>
+            <a:endCxn id="1044" idx="0"/>
+          </p:cNvCxnSpPr>
+          <p:nvPr/>
+        </p:nvCxnSpPr>
+        <p:spPr>
+          <a:xfrm>
+            <a:off x="6247736" y="3387389"/>
+            <a:ext cx="3293" cy="1223871"/>
+          </a:xfrm>
+          <a:prstGeom prst="straightConnector1">
+            <a:avLst/>
+          </a:prstGeom>
+          <a:ln>
+            <a:tailEnd type="triangle"/>
+          </a:ln>
+        </p:spPr>
+        <p:style>
+          <a:lnRef idx="1">
+            <a:schemeClr val="accent1"/>
+          </a:lnRef>
+          <a:fillRef idx="0">
+            <a:schemeClr val="accent1"/>
+          </a:fillRef>
+          <a:effectRef idx="0">
+            <a:schemeClr val="accent1"/>
+          </a:effectRef>
+          <a:fontRef idx="minor">
+            <a:schemeClr val="tx1"/>
+          </a:fontRef>
+        </p:style>
+      </p:cxnSp>
+      <p:sp>
+        <p:nvSpPr>
+          <p:cNvPr id="17" name="TextBox 16">
+            <a:extLst>
+              <a:ext uri="{FF2B5EF4-FFF2-40B4-BE49-F238E27FC236}">
+                <a16:creationId xmlns:a16="http://schemas.microsoft.com/office/drawing/2014/main" id="{F31607A7-A505-C0A1-6F2F-36C09D30959B}"/>
+              </a:ext>
+            </a:extLst>
+          </p:cNvPr>
+          <p:cNvSpPr txBox="1"/>
+          <p:nvPr/>
+        </p:nvSpPr>
+        <p:spPr>
+          <a:xfrm>
+            <a:off x="2523212" y="2951513"/>
+            <a:ext cx="1131015" cy="369332"/>
+          </a:xfrm>
+          <a:prstGeom prst="rect">
+            <a:avLst/>
+          </a:prstGeom>
+          <a:noFill/>
+        </p:spPr>
+        <p:txBody>
+          <a:bodyPr wrap="none" rtlCol="0">
+            <a:spAutoFit/>
+          </a:bodyPr>
+          <a:lstStyle/>
+          <a:p>
+            <a:r>
+              <a:rPr lang="en-AU" dirty="0" err="1"/>
+              <a:t>Dockerfile</a:t>
+            </a:r>
             <a:endParaRPr lang="en-AU" dirty="0"/>
           </a:p>
-          <a:p>
-            <a:pPr marL="0" indent="0">
-              <a:buNone/>
-            </a:pPr>
+        </p:txBody>
+      </p:sp>
+      <p:sp>
+        <p:nvSpPr>
+          <p:cNvPr id="18" name="TextBox 17">
+            <a:extLst>
+              <a:ext uri="{FF2B5EF4-FFF2-40B4-BE49-F238E27FC236}">
+                <a16:creationId xmlns:a16="http://schemas.microsoft.com/office/drawing/2014/main" id="{B495092B-BBF1-F9A9-38DD-A1AFF233209C}"/>
+              </a:ext>
+            </a:extLst>
+          </p:cNvPr>
+          <p:cNvSpPr txBox="1"/>
+          <p:nvPr/>
+        </p:nvSpPr>
+        <p:spPr>
+          <a:xfrm>
+            <a:off x="3297260" y="5545997"/>
+            <a:ext cx="1108573" cy="646331"/>
+          </a:xfrm>
+          <a:prstGeom prst="rect">
+            <a:avLst/>
+          </a:prstGeom>
+          <a:noFill/>
+        </p:spPr>
+        <p:txBody>
+          <a:bodyPr wrap="none" rtlCol="0">
+            <a:spAutoFit/>
+          </a:bodyPr>
+          <a:lstStyle/>
+          <a:p>
             <a:r>
               <a:rPr lang="en-AU" dirty="0"/>
-              <a:t>Image vulnerabilities</a:t>
-            </a:r>
-          </a:p>
-          <a:p>
-            <a:pPr marL="0" indent="0">
-              <a:buNone/>
-            </a:pPr>
-            <a:r>
+              <a:t>Terraform</a:t>
+            </a:r>
+            <a:br>
               <a:rPr lang="en-AU" dirty="0"/>
-              <a:t>Code Scanning tools</a:t>
-            </a:r>
-          </a:p>
-          <a:p>
-            <a:pPr marL="0" indent="0">
-              <a:buNone/>
-            </a:pPr>
+            </a:br>
             <a:r>
               <a:rPr lang="en-AU" dirty="0"/>
-              <a:t>Use private Ips</a:t>
+              <a:t>Pipeline</a:t>
+            </a:r>
+          </a:p>
+        </p:txBody>
+      </p:sp>
+      <p:sp>
+        <p:nvSpPr>
+          <p:cNvPr id="19" name="TextBox 18">
+            <a:extLst>
+              <a:ext uri="{FF2B5EF4-FFF2-40B4-BE49-F238E27FC236}">
+                <a16:creationId xmlns:a16="http://schemas.microsoft.com/office/drawing/2014/main" id="{7E809F83-D924-7A26-EDDB-4AB49902EA1C}"/>
+              </a:ext>
+            </a:extLst>
+          </p:cNvPr>
+          <p:cNvSpPr txBox="1"/>
+          <p:nvPr/>
+        </p:nvSpPr>
+        <p:spPr>
+          <a:xfrm>
+            <a:off x="3876784" y="3004209"/>
+            <a:ext cx="1329536" cy="646331"/>
+          </a:xfrm>
+          <a:prstGeom prst="rect">
+            <a:avLst/>
+          </a:prstGeom>
+          <a:noFill/>
+        </p:spPr>
+        <p:txBody>
+          <a:bodyPr wrap="square" rtlCol="0">
+            <a:spAutoFit/>
+          </a:bodyPr>
+          <a:lstStyle/>
+          <a:p>
+            <a:r>
+              <a:rPr lang="en-AU" dirty="0"/>
+              <a:t>Pipeline</a:t>
+            </a:r>
+            <a:br>
+              <a:rPr lang="en-AU" dirty="0"/>
+            </a:br>
+            <a:r>
+              <a:rPr lang="en-AU" dirty="0"/>
+              <a:t>Build Stage</a:t>
+            </a:r>
+          </a:p>
+        </p:txBody>
+      </p:sp>
+      <p:pic>
+        <p:nvPicPr>
+          <p:cNvPr id="1050" name="Picture 26" descr="Front end - Free web icons">
+            <a:extLst>
+              <a:ext uri="{FF2B5EF4-FFF2-40B4-BE49-F238E27FC236}">
+                <a16:creationId xmlns:a16="http://schemas.microsoft.com/office/drawing/2014/main" id="{1D3E30D1-50CA-E5D6-B049-8257C530CAFB}"/>
+              </a:ext>
+            </a:extLst>
+          </p:cNvPr>
+          <p:cNvPicPr>
+            <a:picLocks noChangeAspect="1" noChangeArrowheads="1"/>
+          </p:cNvPicPr>
+          <p:nvPr/>
+        </p:nvPicPr>
+        <p:blipFill>
+          <a:blip r:embed="rId8">
+            <a:extLst>
+              <a:ext uri="{28A0092B-C50C-407E-A947-70E740481C1C}">
+                <a14:useLocalDpi xmlns:a14="http://schemas.microsoft.com/office/drawing/2010/main" val="0"/>
+              </a:ext>
+            </a:extLst>
+          </a:blip>
+          <a:srcRect/>
+          <a:stretch>
+            <a:fillRect/>
+          </a:stretch>
+        </p:blipFill>
+        <p:spPr bwMode="auto">
+          <a:xfrm>
+            <a:off x="9680915" y="4520199"/>
+            <a:ext cx="1205541" cy="1205541"/>
+          </a:xfrm>
+          <a:prstGeom prst="rect">
+            <a:avLst/>
+          </a:prstGeom>
+          <a:noFill/>
+          <a:extLst>
+            <a:ext uri="{909E8E84-426E-40DD-AFC4-6F175D3DCCD1}">
+              <a14:hiddenFill xmlns:a14="http://schemas.microsoft.com/office/drawing/2010/main">
+                <a:solidFill>
+                  <a:srgbClr val="FFFFFF"/>
+                </a:solidFill>
+              </a14:hiddenFill>
+            </a:ext>
+          </a:extLst>
+        </p:spPr>
+      </p:pic>
+      <p:cxnSp>
+        <p:nvCxnSpPr>
+          <p:cNvPr id="21" name="Straight Arrow Connector 20">
+            <a:extLst>
+              <a:ext uri="{FF2B5EF4-FFF2-40B4-BE49-F238E27FC236}">
+                <a16:creationId xmlns:a16="http://schemas.microsoft.com/office/drawing/2014/main" id="{53AD51F6-4E64-D789-CABF-6557A8BC2B1B}"/>
+              </a:ext>
+            </a:extLst>
+          </p:cNvPr>
+          <p:cNvCxnSpPr>
+            <a:cxnSpLocks/>
+            <a:stCxn id="1044" idx="3"/>
+            <a:endCxn id="1050" idx="1"/>
+          </p:cNvCxnSpPr>
+          <p:nvPr/>
+        </p:nvCxnSpPr>
+        <p:spPr>
+          <a:xfrm>
+            <a:off x="6755008" y="5115240"/>
+            <a:ext cx="2925907" cy="7730"/>
+          </a:xfrm>
+          <a:prstGeom prst="straightConnector1">
+            <a:avLst/>
+          </a:prstGeom>
+          <a:ln>
+            <a:tailEnd type="triangle"/>
+          </a:ln>
+        </p:spPr>
+        <p:style>
+          <a:lnRef idx="1">
+            <a:schemeClr val="accent1"/>
+          </a:lnRef>
+          <a:fillRef idx="0">
+            <a:schemeClr val="accent1"/>
+          </a:fillRef>
+          <a:effectRef idx="0">
+            <a:schemeClr val="accent1"/>
+          </a:effectRef>
+          <a:fontRef idx="minor">
+            <a:schemeClr val="tx1"/>
+          </a:fontRef>
+        </p:style>
+      </p:cxnSp>
+      <p:pic>
+        <p:nvPicPr>
+          <p:cNvPr id="1054" name="Picture 30" descr="Kubernetes Deployment YAML file - YippeeCode">
+            <a:extLst>
+              <a:ext uri="{FF2B5EF4-FFF2-40B4-BE49-F238E27FC236}">
+                <a16:creationId xmlns:a16="http://schemas.microsoft.com/office/drawing/2014/main" id="{E2EB3D28-178C-1967-0AEB-2AD66B58EE05}"/>
+              </a:ext>
+            </a:extLst>
+          </p:cNvPr>
+          <p:cNvPicPr>
+            <a:picLocks noChangeAspect="1" noChangeArrowheads="1"/>
+          </p:cNvPicPr>
+          <p:nvPr/>
+        </p:nvPicPr>
+        <p:blipFill>
+          <a:blip r:embed="rId9">
+            <a:extLst>
+              <a:ext uri="{28A0092B-C50C-407E-A947-70E740481C1C}">
+                <a14:useLocalDpi xmlns:a14="http://schemas.microsoft.com/office/drawing/2010/main" val="0"/>
+              </a:ext>
+            </a:extLst>
+          </a:blip>
+          <a:srcRect/>
+          <a:stretch>
+            <a:fillRect/>
+          </a:stretch>
+        </p:blipFill>
+        <p:spPr bwMode="auto">
+          <a:xfrm>
+            <a:off x="7863343" y="4792793"/>
+            <a:ext cx="734806" cy="734806"/>
+          </a:xfrm>
+          <a:prstGeom prst="rect">
+            <a:avLst/>
+          </a:prstGeom>
+          <a:noFill/>
+          <a:extLst>
+            <a:ext uri="{909E8E84-426E-40DD-AFC4-6F175D3DCCD1}">
+              <a14:hiddenFill xmlns:a14="http://schemas.microsoft.com/office/drawing/2010/main">
+                <a:solidFill>
+                  <a:srgbClr val="FFFFFF"/>
+                </a:solidFill>
+              </a14:hiddenFill>
+            </a:ext>
+          </a:extLst>
+        </p:spPr>
+      </p:pic>
+      <p:sp>
+        <p:nvSpPr>
+          <p:cNvPr id="28" name="TextBox 27">
+            <a:extLst>
+              <a:ext uri="{FF2B5EF4-FFF2-40B4-BE49-F238E27FC236}">
+                <a16:creationId xmlns:a16="http://schemas.microsoft.com/office/drawing/2014/main" id="{0B707100-2400-B35B-6B12-8DA71A871947}"/>
+              </a:ext>
+            </a:extLst>
+          </p:cNvPr>
+          <p:cNvSpPr txBox="1"/>
+          <p:nvPr/>
+        </p:nvSpPr>
+        <p:spPr>
+          <a:xfrm>
+            <a:off x="7538608" y="5532599"/>
+            <a:ext cx="1474839" cy="923330"/>
+          </a:xfrm>
+          <a:prstGeom prst="rect">
+            <a:avLst/>
+          </a:prstGeom>
+          <a:noFill/>
+        </p:spPr>
+        <p:txBody>
+          <a:bodyPr wrap="square" rtlCol="0">
+            <a:spAutoFit/>
+          </a:bodyPr>
+          <a:lstStyle/>
+          <a:p>
+            <a:r>
+              <a:rPr lang="en-AU" dirty="0"/>
+              <a:t>Kubernetes Service and deployment</a:t>
+            </a:r>
+          </a:p>
+        </p:txBody>
+      </p:sp>
+      <p:sp>
+        <p:nvSpPr>
+          <p:cNvPr id="31" name="TextBox 30">
+            <a:extLst>
+              <a:ext uri="{FF2B5EF4-FFF2-40B4-BE49-F238E27FC236}">
+                <a16:creationId xmlns:a16="http://schemas.microsoft.com/office/drawing/2014/main" id="{D121C24D-8D85-24EF-8464-04556EFA50D1}"/>
+              </a:ext>
+            </a:extLst>
+          </p:cNvPr>
+          <p:cNvSpPr txBox="1"/>
+          <p:nvPr/>
+        </p:nvSpPr>
+        <p:spPr>
+          <a:xfrm>
+            <a:off x="9532133" y="5809598"/>
+            <a:ext cx="2460930" cy="646331"/>
+          </a:xfrm>
+          <a:prstGeom prst="rect">
+            <a:avLst/>
+          </a:prstGeom>
+          <a:noFill/>
+        </p:spPr>
+        <p:txBody>
+          <a:bodyPr wrap="none" rtlCol="0">
+            <a:spAutoFit/>
+          </a:bodyPr>
+          <a:lstStyle/>
+          <a:p>
+            <a:r>
+              <a:rPr lang="en-AU" dirty="0"/>
+              <a:t>Application UI</a:t>
+            </a:r>
+          </a:p>
+          <a:p>
+            <a:r>
+              <a:rPr lang="en-AU" dirty="0"/>
+              <a:t>Running on specific port</a:t>
+            </a:r>
+          </a:p>
+        </p:txBody>
+      </p:sp>
+      <p:pic>
+        <p:nvPicPr>
+          <p:cNvPr id="1056" name="Picture 32" descr="User Icon&quot; Images – Browse 6,201 Stock Photos, Vectors, and Video | Adobe  Stock">
+            <a:extLst>
+              <a:ext uri="{FF2B5EF4-FFF2-40B4-BE49-F238E27FC236}">
+                <a16:creationId xmlns:a16="http://schemas.microsoft.com/office/drawing/2014/main" id="{DF07765B-2F1B-3270-1FDC-AA84A8A0F668}"/>
+              </a:ext>
+            </a:extLst>
+          </p:cNvPr>
+          <p:cNvPicPr>
+            <a:picLocks noChangeAspect="1" noChangeArrowheads="1"/>
+          </p:cNvPicPr>
+          <p:nvPr/>
+        </p:nvPicPr>
+        <p:blipFill>
+          <a:blip r:embed="rId10">
+            <a:extLst>
+              <a:ext uri="{28A0092B-C50C-407E-A947-70E740481C1C}">
+                <a14:useLocalDpi xmlns:a14="http://schemas.microsoft.com/office/drawing/2010/main" val="0"/>
+              </a:ext>
+            </a:extLst>
+          </a:blip>
+          <a:srcRect/>
+          <a:stretch>
+            <a:fillRect/>
+          </a:stretch>
+        </p:blipFill>
+        <p:spPr bwMode="auto">
+          <a:xfrm>
+            <a:off x="9873614" y="2442275"/>
+            <a:ext cx="802623" cy="708592"/>
+          </a:xfrm>
+          <a:prstGeom prst="rect">
+            <a:avLst/>
+          </a:prstGeom>
+          <a:noFill/>
+          <a:extLst>
+            <a:ext uri="{909E8E84-426E-40DD-AFC4-6F175D3DCCD1}">
+              <a14:hiddenFill xmlns:a14="http://schemas.microsoft.com/office/drawing/2010/main">
+                <a:solidFill>
+                  <a:srgbClr val="FFFFFF"/>
+                </a:solidFill>
+              </a14:hiddenFill>
+            </a:ext>
+          </a:extLst>
+        </p:spPr>
+      </p:pic>
+      <p:cxnSp>
+        <p:nvCxnSpPr>
+          <p:cNvPr id="32" name="Straight Arrow Connector 31">
+            <a:extLst>
+              <a:ext uri="{FF2B5EF4-FFF2-40B4-BE49-F238E27FC236}">
+                <a16:creationId xmlns:a16="http://schemas.microsoft.com/office/drawing/2014/main" id="{F3FED547-1495-B24A-F115-09677451DF5C}"/>
+              </a:ext>
+            </a:extLst>
+          </p:cNvPr>
+          <p:cNvCxnSpPr>
+            <a:cxnSpLocks/>
+          </p:cNvCxnSpPr>
+          <p:nvPr/>
+        </p:nvCxnSpPr>
+        <p:spPr>
+          <a:xfrm>
+            <a:off x="10283685" y="3274258"/>
+            <a:ext cx="3293" cy="1223871"/>
+          </a:xfrm>
+          <a:prstGeom prst="straightConnector1">
+            <a:avLst/>
+          </a:prstGeom>
+          <a:ln>
+            <a:tailEnd type="triangle"/>
+          </a:ln>
+        </p:spPr>
+        <p:style>
+          <a:lnRef idx="1">
+            <a:schemeClr val="accent1"/>
+          </a:lnRef>
+          <a:fillRef idx="0">
+            <a:schemeClr val="accent1"/>
+          </a:fillRef>
+          <a:effectRef idx="0">
+            <a:schemeClr val="accent1"/>
+          </a:effectRef>
+          <a:fontRef idx="minor">
+            <a:schemeClr val="tx1"/>
+          </a:fontRef>
+        </p:style>
+      </p:cxnSp>
+      <p:sp>
+        <p:nvSpPr>
+          <p:cNvPr id="33" name="TextBox 32">
+            <a:extLst>
+              <a:ext uri="{FF2B5EF4-FFF2-40B4-BE49-F238E27FC236}">
+                <a16:creationId xmlns:a16="http://schemas.microsoft.com/office/drawing/2014/main" id="{277DCC29-A361-935E-24B1-65F295E18ECE}"/>
+              </a:ext>
+            </a:extLst>
+          </p:cNvPr>
+          <p:cNvSpPr txBox="1"/>
+          <p:nvPr/>
+        </p:nvSpPr>
+        <p:spPr>
+          <a:xfrm>
+            <a:off x="10441617" y="3622887"/>
+            <a:ext cx="1293944" cy="369332"/>
+          </a:xfrm>
+          <a:prstGeom prst="rect">
+            <a:avLst/>
+          </a:prstGeom>
+          <a:noFill/>
+        </p:spPr>
+        <p:txBody>
+          <a:bodyPr wrap="none" rtlCol="0">
+            <a:spAutoFit/>
+          </a:bodyPr>
+          <a:lstStyle/>
+          <a:p>
+            <a:r>
+              <a:rPr lang="en-AU" dirty="0"/>
+              <a:t>User Access</a:t>
+            </a:r>
+          </a:p>
+        </p:txBody>
+      </p:sp>
+      <p:sp>
+        <p:nvSpPr>
+          <p:cNvPr id="34" name="Rectangle: Rounded Corners 33">
+            <a:extLst>
+              <a:ext uri="{FF2B5EF4-FFF2-40B4-BE49-F238E27FC236}">
+                <a16:creationId xmlns:a16="http://schemas.microsoft.com/office/drawing/2014/main" id="{B3BDFEC1-8571-7652-FDF5-426C962B3A6C}"/>
+              </a:ext>
+            </a:extLst>
+          </p:cNvPr>
+          <p:cNvSpPr/>
+          <p:nvPr/>
+        </p:nvSpPr>
+        <p:spPr>
+          <a:xfrm>
+            <a:off x="583447" y="1680761"/>
+            <a:ext cx="8618084" cy="4975677"/>
+          </a:xfrm>
+          <a:prstGeom prst="roundRect">
+            <a:avLst/>
+          </a:prstGeom>
+          <a:noFill/>
+          <a:ln w="38100"/>
+        </p:spPr>
+        <p:style>
+          <a:lnRef idx="2">
+            <a:schemeClr val="accent1">
+              <a:shade val="15000"/>
+            </a:schemeClr>
+          </a:lnRef>
+          <a:fillRef idx="1">
+            <a:schemeClr val="accent1"/>
+          </a:fillRef>
+          <a:effectRef idx="0">
+            <a:schemeClr val="accent1"/>
+          </a:effectRef>
+          <a:fontRef idx="minor">
+            <a:schemeClr val="lt1"/>
+          </a:fontRef>
+        </p:style>
+        <p:txBody>
+          <a:bodyPr rtlCol="0" anchor="ctr"/>
+          <a:lstStyle/>
+          <a:p>
+            <a:pPr algn="ctr"/>
+            <a:endParaRPr lang="en-AU"/>
+          </a:p>
+        </p:txBody>
+      </p:sp>
+      <p:sp>
+        <p:nvSpPr>
+          <p:cNvPr id="35" name="TextBox 34">
+            <a:extLst>
+              <a:ext uri="{FF2B5EF4-FFF2-40B4-BE49-F238E27FC236}">
+                <a16:creationId xmlns:a16="http://schemas.microsoft.com/office/drawing/2014/main" id="{67D9E281-4937-2A30-0C98-5D34FBA63CF5}"/>
+              </a:ext>
+            </a:extLst>
+          </p:cNvPr>
+          <p:cNvSpPr txBox="1"/>
+          <p:nvPr/>
+        </p:nvSpPr>
+        <p:spPr>
+          <a:xfrm>
+            <a:off x="6853446" y="3663790"/>
+            <a:ext cx="1470001" cy="646331"/>
+          </a:xfrm>
+          <a:prstGeom prst="rect">
+            <a:avLst/>
+          </a:prstGeom>
+          <a:noFill/>
+        </p:spPr>
+        <p:txBody>
+          <a:bodyPr wrap="square" rtlCol="0">
+            <a:spAutoFit/>
+          </a:bodyPr>
+          <a:lstStyle/>
+          <a:p>
+            <a:r>
+              <a:rPr lang="en-AU" dirty="0"/>
+              <a:t>Pipeline</a:t>
+            </a:r>
+            <a:br>
+              <a:rPr lang="en-AU" dirty="0"/>
+            </a:br>
+            <a:r>
+              <a:rPr lang="en-AU" dirty="0"/>
+              <a:t>Deploy Stage</a:t>
+            </a:r>
+          </a:p>
+        </p:txBody>
+      </p:sp>
+      <p:pic>
+        <p:nvPicPr>
+          <p:cNvPr id="36" name="Picture 22" descr="Azure DevOps Pipelines: Naming and Tagging | by Eric Anderson | ITNEXT">
+            <a:extLst>
+              <a:ext uri="{FF2B5EF4-FFF2-40B4-BE49-F238E27FC236}">
+                <a16:creationId xmlns:a16="http://schemas.microsoft.com/office/drawing/2014/main" id="{95C87785-FF86-F14D-789F-12B5C823C35F}"/>
+              </a:ext>
+            </a:extLst>
+          </p:cNvPr>
+          <p:cNvPicPr>
+            <a:picLocks noChangeAspect="1" noChangeArrowheads="1"/>
+          </p:cNvPicPr>
+          <p:nvPr/>
+        </p:nvPicPr>
+        <p:blipFill>
+          <a:blip r:embed="rId7">
+            <a:extLst>
+              <a:ext uri="{28A0092B-C50C-407E-A947-70E740481C1C}">
+                <a14:useLocalDpi xmlns:a14="http://schemas.microsoft.com/office/drawing/2010/main" val="0"/>
+              </a:ext>
+            </a:extLst>
+          </a:blip>
+          <a:srcRect/>
+          <a:stretch>
+            <a:fillRect/>
+          </a:stretch>
+        </p:blipFill>
+        <p:spPr bwMode="auto">
+          <a:xfrm>
+            <a:off x="5929223" y="3600211"/>
+            <a:ext cx="706463" cy="706463"/>
+          </a:xfrm>
+          <a:prstGeom prst="rect">
+            <a:avLst/>
+          </a:prstGeom>
+          <a:noFill/>
+          <a:extLst>
+            <a:ext uri="{909E8E84-426E-40DD-AFC4-6F175D3DCCD1}">
+              <a14:hiddenFill xmlns:a14="http://schemas.microsoft.com/office/drawing/2010/main">
+                <a:solidFill>
+                  <a:srgbClr val="FFFFFF"/>
+                </a:solidFill>
+              </a14:hiddenFill>
+            </a:ext>
+          </a:extLst>
+        </p:spPr>
+      </p:pic>
+      <p:sp>
+        <p:nvSpPr>
+          <p:cNvPr id="37" name="TextBox 36">
+            <a:extLst>
+              <a:ext uri="{FF2B5EF4-FFF2-40B4-BE49-F238E27FC236}">
+                <a16:creationId xmlns:a16="http://schemas.microsoft.com/office/drawing/2014/main" id="{74D47DCF-60CE-4DD9-22C3-504B482C36E2}"/>
+              </a:ext>
+            </a:extLst>
+          </p:cNvPr>
+          <p:cNvSpPr txBox="1"/>
+          <p:nvPr/>
+        </p:nvSpPr>
+        <p:spPr>
+          <a:xfrm>
+            <a:off x="7981561" y="1928072"/>
+            <a:ext cx="973108" cy="369332"/>
+          </a:xfrm>
+          <a:prstGeom prst="rect">
+            <a:avLst/>
+          </a:prstGeom>
+          <a:noFill/>
+        </p:spPr>
+        <p:txBody>
+          <a:bodyPr wrap="square" rtlCol="0">
+            <a:spAutoFit/>
+          </a:bodyPr>
+          <a:lstStyle/>
+          <a:p>
+            <a:r>
+              <a:rPr lang="en-AU" dirty="0"/>
+              <a:t>Internal</a:t>
             </a:r>
           </a:p>
         </p:txBody>
@@ -3537,7 +4316,7 @@
     </p:spTree>
     <p:extLst>
       <p:ext uri="{BB962C8B-B14F-4D97-AF65-F5344CB8AC3E}">
-        <p14:creationId xmlns:p14="http://schemas.microsoft.com/office/powerpoint/2010/main" val="206237656"/>
+        <p14:creationId xmlns:p14="http://schemas.microsoft.com/office/powerpoint/2010/main" val="1735965844"/>
       </p:ext>
     </p:extLst>
   </p:cSld>
@@ -3569,7 +4348,7 @@
           <p:cNvPr id="2" name="Title 1">
             <a:extLst>
               <a:ext uri="{FF2B5EF4-FFF2-40B4-BE49-F238E27FC236}">
-                <a16:creationId xmlns:a16="http://schemas.microsoft.com/office/drawing/2014/main" id="{D4BBF554-9A22-FF7B-4E7E-43DD222D1497}"/>
+                <a16:creationId xmlns:a16="http://schemas.microsoft.com/office/drawing/2014/main" id="{4BFF4E43-ED38-AA82-A47A-FDDA4F871D16}"/>
               </a:ext>
             </a:extLst>
           </p:cNvPr>
@@ -3587,7 +4366,7 @@
           <a:p>
             <a:r>
               <a:rPr lang="en-AU" dirty="0"/>
-              <a:t>Access Management</a:t>
+              <a:t>Application Security</a:t>
             </a:r>
           </a:p>
         </p:txBody>
@@ -3597,7 +4376,7 @@
           <p:cNvPr id="3" name="Content Placeholder 2">
             <a:extLst>
               <a:ext uri="{FF2B5EF4-FFF2-40B4-BE49-F238E27FC236}">
-                <a16:creationId xmlns:a16="http://schemas.microsoft.com/office/drawing/2014/main" id="{79DD11FB-53B3-9FFE-8637-21663FD5A49A}"/>
+                <a16:creationId xmlns:a16="http://schemas.microsoft.com/office/drawing/2014/main" id="{EE3A9785-06E5-EEF3-119D-01DAAED8C69A}"/>
               </a:ext>
             </a:extLst>
           </p:cNvPr>
@@ -3610,27 +4389,76 @@
         </p:nvSpPr>
         <p:spPr/>
         <p:txBody>
-          <a:bodyPr/>
-          <a:lstStyle/>
-          <a:p>
+          <a:bodyPr>
+            <a:normAutofit/>
+          </a:bodyPr>
+          <a:lstStyle/>
+          <a:p>
+            <a:pPr marL="0" indent="0">
+              <a:buNone/>
+            </a:pPr>
             <a:r>
               <a:rPr lang="en-AU" dirty="0"/>
-              <a:t>RBAC on resources.</a:t>
-            </a:r>
-          </a:p>
-          <a:p>
+              <a:t>Encryption:</a:t>
+            </a:r>
+          </a:p>
+          <a:p>
+            <a:pPr>
+              <a:buFontTx/>
+              <a:buChar char="-"/>
+            </a:pPr>
             <a:r>
               <a:rPr lang="en-AU" dirty="0"/>
-              <a:t>Secure Azure Active directory access</a:t>
-            </a:r>
-          </a:p>
-          <a:p>
+              <a:t>Use SSL certificates with Ingress </a:t>
+            </a:r>
+          </a:p>
+          <a:p>
+            <a:pPr>
+              <a:buFontTx/>
+              <a:buChar char="-"/>
+            </a:pPr>
             <a:r>
               <a:rPr lang="en-AU" dirty="0"/>
-              <a:t>Service account for application and managed identities for resources</a:t>
-            </a:r>
-          </a:p>
-          <a:p>
+              <a:t>If using a backend Database, make sure data are encrypted and connection is secured (TLS, private internal IPs)</a:t>
+            </a:r>
+          </a:p>
+          <a:p>
+            <a:endParaRPr lang="en-AU" dirty="0"/>
+          </a:p>
+          <a:p>
+            <a:pPr marL="0" indent="0">
+              <a:buNone/>
+            </a:pPr>
+            <a:r>
+              <a:rPr lang="en-AU" dirty="0"/>
+              <a:t>Image vulnerabilities:</a:t>
+            </a:r>
+          </a:p>
+          <a:p>
+            <a:pPr>
+              <a:buFontTx/>
+              <a:buChar char="-"/>
+            </a:pPr>
+            <a:r>
+              <a:rPr lang="en-AU" dirty="0"/>
+              <a:t>Code scanning tools</a:t>
+            </a:r>
+          </a:p>
+          <a:p>
+            <a:pPr>
+              <a:buFontTx/>
+              <a:buChar char="-"/>
+            </a:pPr>
+            <a:r>
+              <a:rPr lang="en-AU" dirty="0"/>
+              <a:t>Image scanning tool</a:t>
+            </a:r>
+          </a:p>
+          <a:p>
+            <a:pPr>
+              <a:buFontTx/>
+              <a:buChar char="-"/>
+            </a:pPr>
             <a:endParaRPr lang="en-AU" dirty="0"/>
           </a:p>
         </p:txBody>
@@ -3638,7 +4466,7 @@
     </p:spTree>
     <p:extLst>
       <p:ext uri="{BB962C8B-B14F-4D97-AF65-F5344CB8AC3E}">
-        <p14:creationId xmlns:p14="http://schemas.microsoft.com/office/powerpoint/2010/main" val="2678818046"/>
+        <p14:creationId xmlns:p14="http://schemas.microsoft.com/office/powerpoint/2010/main" val="206237656"/>
       </p:ext>
     </p:extLst>
   </p:cSld>
@@ -3667,66 +4495,43 @@
       </p:grpSpPr>
       <p:sp>
         <p:nvSpPr>
-          <p:cNvPr id="4" name="Rectangle 3">
+          <p:cNvPr id="2" name="Title 1">
             <a:extLst>
               <a:ext uri="{FF2B5EF4-FFF2-40B4-BE49-F238E27FC236}">
-                <a16:creationId xmlns:a16="http://schemas.microsoft.com/office/drawing/2014/main" id="{8604819A-0541-3382-7F21-9C13292EC876}"/>
+                <a16:creationId xmlns:a16="http://schemas.microsoft.com/office/drawing/2014/main" id="{D4BBF554-9A22-FF7B-4E7E-43DD222D1497}"/>
               </a:ext>
             </a:extLst>
           </p:cNvPr>
-          <p:cNvSpPr/>
-          <p:nvPr/>
+          <p:cNvSpPr>
+            <a:spLocks noGrp="1"/>
+          </p:cNvSpPr>
+          <p:nvPr>
+            <p:ph type="title"/>
+          </p:nvPr>
         </p:nvSpPr>
         <p:spPr>
           <a:xfrm>
-            <a:off x="-29496" y="433949"/>
-            <a:ext cx="12545961" cy="1129378"/>
-          </a:xfrm>
-          <a:prstGeom prst="rect">
-            <a:avLst/>
-          </a:prstGeom>
-          <a:solidFill>
-            <a:srgbClr val="002060"/>
-          </a:solidFill>
-          <a:ln>
-            <a:solidFill>
-              <a:schemeClr val="accent1">
-                <a:lumMod val="50000"/>
-              </a:schemeClr>
-            </a:solidFill>
-          </a:ln>
-        </p:spPr>
-        <p:style>
-          <a:lnRef idx="2">
-            <a:schemeClr val="accent1">
-              <a:shade val="15000"/>
-            </a:schemeClr>
-          </a:lnRef>
-          <a:fillRef idx="1">
-            <a:schemeClr val="accent1"/>
-          </a:fillRef>
-          <a:effectRef idx="0">
-            <a:schemeClr val="accent1"/>
-          </a:effectRef>
-          <a:fontRef idx="minor">
-            <a:schemeClr val="lt1"/>
-          </a:fontRef>
-        </p:style>
-        <p:txBody>
-          <a:bodyPr rtlCol="0" anchor="ctr"/>
-          <a:lstStyle/>
-          <a:p>
-            <a:pPr algn="ctr"/>
-            <a:endParaRPr lang="en-AU"/>
-          </a:p>
-        </p:txBody>
-      </p:sp>
-      <p:sp>
-        <p:nvSpPr>
-          <p:cNvPr id="2" name="Title 1">
+            <a:off x="838199" y="365125"/>
+            <a:ext cx="10950677" cy="1325563"/>
+          </a:xfrm>
+        </p:spPr>
+        <p:txBody>
+          <a:bodyPr/>
+          <a:lstStyle/>
+          <a:p>
+            <a:r>
+              <a:rPr lang="en-AU" dirty="0"/>
+              <a:t>Platform Security</a:t>
+            </a:r>
+          </a:p>
+        </p:txBody>
+      </p:sp>
+      <p:sp>
+        <p:nvSpPr>
+          <p:cNvPr id="3" name="Content Placeholder 2">
             <a:extLst>
               <a:ext uri="{FF2B5EF4-FFF2-40B4-BE49-F238E27FC236}">
-                <a16:creationId xmlns:a16="http://schemas.microsoft.com/office/drawing/2014/main" id="{C3B136E2-270D-F91B-AC17-598225C6D7F5}"/>
+                <a16:creationId xmlns:a16="http://schemas.microsoft.com/office/drawing/2014/main" id="{79DD11FB-53B3-9FFE-8637-21663FD5A49A}"/>
               </a:ext>
             </a:extLst>
           </p:cNvPr>
@@ -3734,59 +4539,44 @@
             <a:spLocks noGrp="1"/>
           </p:cNvSpPr>
           <p:nvPr>
-            <p:ph type="title"/>
+            <p:ph idx="1"/>
           </p:nvPr>
         </p:nvSpPr>
         <p:spPr/>
         <p:txBody>
           <a:bodyPr>
-            <a:normAutofit/>
+            <a:normAutofit fontScale="92500" lnSpcReduction="10000"/>
           </a:bodyPr>
           <a:lstStyle/>
           <a:p>
-            <a:r>
-              <a:rPr lang="en-AU" sz="5400" b="1" dirty="0">
-                <a:solidFill>
-                  <a:schemeClr val="bg1"/>
-                </a:solidFill>
-              </a:rPr>
-              <a:t>Monitoring</a:t>
-            </a:r>
-          </a:p>
-        </p:txBody>
-      </p:sp>
-      <p:sp>
-        <p:nvSpPr>
-          <p:cNvPr id="3" name="Content Placeholder 2">
-            <a:extLst>
-              <a:ext uri="{FF2B5EF4-FFF2-40B4-BE49-F238E27FC236}">
-                <a16:creationId xmlns:a16="http://schemas.microsoft.com/office/drawing/2014/main" id="{874BF9E7-DF75-3FDE-C915-DB56BD255A04}"/>
-              </a:ext>
-            </a:extLst>
-          </p:cNvPr>
-          <p:cNvSpPr>
-            <a:spLocks noGrp="1"/>
-          </p:cNvSpPr>
-          <p:nvPr>
-            <p:ph idx="1"/>
-          </p:nvPr>
-        </p:nvSpPr>
-        <p:spPr>
-          <a:xfrm>
-            <a:off x="838200" y="1825625"/>
-            <a:ext cx="10515600" cy="4667250"/>
-          </a:xfrm>
-        </p:spPr>
-        <p:txBody>
-          <a:bodyPr>
-            <a:normAutofit/>
-          </a:bodyPr>
-          <a:lstStyle/>
-          <a:p>
+            <a:pPr marL="0" indent="0">
+              <a:buNone/>
+            </a:pPr>
             <a:r>
               <a:rPr lang="en-AU" dirty="0"/>
-              <a:t>Security Logs</a:t>
-            </a:r>
+              <a:t>Access Management</a:t>
+            </a:r>
+          </a:p>
+          <a:p>
+            <a:r>
+              <a:rPr lang="en-AU" dirty="0"/>
+              <a:t>RBAC on resources</a:t>
+            </a:r>
+          </a:p>
+          <a:p>
+            <a:r>
+              <a:rPr lang="en-AU" dirty="0"/>
+              <a:t>Secured Azure Active directory access with MFA</a:t>
+            </a:r>
+          </a:p>
+          <a:p>
+            <a:r>
+              <a:rPr lang="en-AU" dirty="0"/>
+              <a:t>Service account for application and managed identities for resources</a:t>
+            </a:r>
+          </a:p>
+          <a:p>
+            <a:endParaRPr lang="en-AU" dirty="0"/>
           </a:p>
           <a:p>
             <a:pPr marL="0" indent="0">
@@ -3794,71 +4584,39 @@
             </a:pPr>
             <a:r>
               <a:rPr lang="en-AU" dirty="0"/>
-              <a:t>Monitor performance</a:t>
-            </a:r>
-          </a:p>
-          <a:p>
-            <a:pPr marL="0" indent="0">
-              <a:buNone/>
-            </a:pPr>
+              <a:t>Infrastructure Security</a:t>
+            </a:r>
+          </a:p>
+          <a:p>
             <a:r>
               <a:rPr lang="en-AU" dirty="0"/>
-              <a:t>Use Azure sentinel or 3</a:t>
-            </a:r>
-            <a:r>
-              <a:rPr lang="en-AU" baseline="30000" dirty="0"/>
-              <a:t>rd</a:t>
-            </a:r>
+              <a:t>Firewalls</a:t>
+            </a:r>
+          </a:p>
+          <a:p>
             <a:r>
               <a:rPr lang="en-AU" dirty="0"/>
-              <a:t> party tool (Datadog) </a:t>
+              <a:t>Admin access via VPN</a:t>
             </a:r>
           </a:p>
           <a:p>
             <a:r>
               <a:rPr lang="en-AU" dirty="0"/>
-              <a:t>Data Access logs</a:t>
-            </a:r>
-          </a:p>
-          <a:p>
-            <a:pPr marL="0" indent="0">
-              <a:buNone/>
-            </a:pPr>
-            <a:r>
-              <a:rPr lang="en-AU" dirty="0"/>
-              <a:t>Set app sensitive data in an external secured database accessible only through the app and admins.</a:t>
-            </a:r>
-          </a:p>
-          <a:p>
-            <a:pPr marL="0" indent="0">
-              <a:buNone/>
-            </a:pPr>
-            <a:r>
-              <a:rPr lang="en-AU" dirty="0"/>
-              <a:t>Limit access control</a:t>
-            </a:r>
-          </a:p>
-          <a:p>
-            <a:r>
-              <a:rPr lang="en-AU" dirty="0"/>
-              <a:t>Audits</a:t>
-            </a:r>
-          </a:p>
-          <a:p>
-            <a:pPr marL="0" indent="0">
-              <a:buNone/>
-            </a:pPr>
-            <a:r>
-              <a:rPr lang="en-AU" dirty="0"/>
-              <a:t>Regular monitoring</a:t>
-            </a:r>
+              <a:t>If backend database, API or storage, allow only via internal backend services</a:t>
+            </a:r>
+          </a:p>
+          <a:p>
+            <a:endParaRPr lang="en-AU" dirty="0"/>
+          </a:p>
+          <a:p>
+            <a:endParaRPr lang="en-AU" dirty="0"/>
           </a:p>
         </p:txBody>
       </p:sp>
     </p:spTree>
     <p:extLst>
       <p:ext uri="{BB962C8B-B14F-4D97-AF65-F5344CB8AC3E}">
-        <p14:creationId xmlns:p14="http://schemas.microsoft.com/office/powerpoint/2010/main" val="3945841099"/>
+        <p14:creationId xmlns:p14="http://schemas.microsoft.com/office/powerpoint/2010/main" val="2678818046"/>
       </p:ext>
     </p:extLst>
   </p:cSld>
@@ -3890,7 +4648,7 @@
           <p:cNvPr id="2" name="Title 1">
             <a:extLst>
               <a:ext uri="{FF2B5EF4-FFF2-40B4-BE49-F238E27FC236}">
-                <a16:creationId xmlns:a16="http://schemas.microsoft.com/office/drawing/2014/main" id="{A606E1CC-C37E-F6AA-7E3C-42F0A32C457D}"/>
+                <a16:creationId xmlns:a16="http://schemas.microsoft.com/office/drawing/2014/main" id="{C3B136E2-270D-F91B-AC17-598225C6D7F5}"/>
               </a:ext>
             </a:extLst>
           </p:cNvPr>
@@ -3903,12 +4661,18 @@
         </p:nvSpPr>
         <p:spPr/>
         <p:txBody>
-          <a:bodyPr/>
-          <a:lstStyle/>
-          <a:p>
-            <a:r>
-              <a:rPr lang="en-AU" dirty="0"/>
-              <a:t>Secured infrastructure</a:t>
+          <a:bodyPr>
+            <a:normAutofit/>
+          </a:bodyPr>
+          <a:lstStyle/>
+          <a:p>
+            <a:r>
+              <a:rPr lang="en-AU" sz="5400" b="1" dirty="0">
+                <a:solidFill>
+                  <a:schemeClr val="bg1"/>
+                </a:solidFill>
+              </a:rPr>
+              <a:t>Monitoring</a:t>
             </a:r>
           </a:p>
         </p:txBody>
@@ -3918,7 +4682,7 @@
           <p:cNvPr id="3" name="Content Placeholder 2">
             <a:extLst>
               <a:ext uri="{FF2B5EF4-FFF2-40B4-BE49-F238E27FC236}">
-                <a16:creationId xmlns:a16="http://schemas.microsoft.com/office/drawing/2014/main" id="{9B49684B-A30A-994F-894D-8C5CFF52D43E}"/>
+                <a16:creationId xmlns:a16="http://schemas.microsoft.com/office/drawing/2014/main" id="{874BF9E7-DF75-3FDE-C915-DB56BD255A04}"/>
               </a:ext>
             </a:extLst>
           </p:cNvPr>
@@ -3929,51 +4693,148 @@
             <p:ph idx="1"/>
           </p:nvPr>
         </p:nvSpPr>
-        <p:spPr/>
-        <p:txBody>
-          <a:bodyPr/>
-          <a:lstStyle/>
-          <a:p>
+        <p:spPr>
+          <a:xfrm>
+            <a:off x="838200" y="1825625"/>
+            <a:ext cx="10515600" cy="4667250"/>
+          </a:xfrm>
+        </p:spPr>
+        <p:txBody>
+          <a:bodyPr>
+            <a:normAutofit lnSpcReduction="10000"/>
+          </a:bodyPr>
+          <a:lstStyle/>
+          <a:p>
+            <a:pPr marL="0" indent="0">
+              <a:buNone/>
+            </a:pPr>
             <a:r>
               <a:rPr lang="en-AU" dirty="0"/>
-              <a:t>Firewalls</a:t>
+              <a:t>Security Logs</a:t>
             </a:r>
           </a:p>
           <a:p>
             <a:r>
               <a:rPr lang="en-AU" dirty="0"/>
-              <a:t>MFA</a:t>
+              <a:t>Monitor performance, and setup alerts if cluster is down (OOM)</a:t>
             </a:r>
           </a:p>
           <a:p>
             <a:r>
               <a:rPr lang="en-AU" dirty="0"/>
-              <a:t>Secure access to API, setup allowed origins for queries</a:t>
-            </a:r>
-          </a:p>
-          <a:p>
+              <a:t>Use Azure sentinel or 3</a:t>
+            </a:r>
+            <a:r>
+              <a:rPr lang="en-AU" baseline="30000" dirty="0"/>
+              <a:t>rd</a:t>
+            </a:r>
             <a:r>
               <a:rPr lang="en-AU" dirty="0"/>
-              <a:t>Setup </a:t>
-            </a:r>
-            <a:r>
-              <a:rPr lang="en-AU" dirty="0" err="1"/>
-              <a:t>secureity</a:t>
-            </a:r>
+              <a:t> party tool (Datadog) </a:t>
+            </a:r>
+          </a:p>
+          <a:p>
+            <a:pPr marL="0" indent="0">
+              <a:buNone/>
+            </a:pPr>
+            <a:endParaRPr lang="en-AU" dirty="0"/>
+          </a:p>
+          <a:p>
+            <a:pPr marL="0" indent="0">
+              <a:buNone/>
+            </a:pPr>
             <a:r>
               <a:rPr lang="en-AU" dirty="0"/>
-              <a:t> headers for HTTPS</a:t>
-            </a:r>
-          </a:p>
-          <a:p>
+              <a:t>Data Access logs</a:t>
+            </a:r>
+          </a:p>
+          <a:p>
+            <a:r>
+              <a:rPr lang="en-AU" dirty="0"/>
+              <a:t>Store app sensitive data in an external secured database accessible only internally and by specific admins.</a:t>
+            </a:r>
+          </a:p>
+          <a:p>
+            <a:pPr marL="0" indent="0">
+              <a:buNone/>
+            </a:pPr>
             <a:endParaRPr lang="en-AU" dirty="0"/>
+          </a:p>
+          <a:p>
+            <a:pPr marL="0" indent="0">
+              <a:buNone/>
+            </a:pPr>
+            <a:r>
+              <a:rPr lang="en-AU" dirty="0"/>
+              <a:t>Audits</a:t>
+            </a:r>
+          </a:p>
+          <a:p>
+            <a:r>
+              <a:rPr lang="en-AU" dirty="0"/>
+              <a:t>Regular monitoring and reports</a:t>
+            </a:r>
+          </a:p>
+        </p:txBody>
+      </p:sp>
+      <p:sp>
+        <p:nvSpPr>
+          <p:cNvPr id="5" name="Title 1">
+            <a:extLst>
+              <a:ext uri="{FF2B5EF4-FFF2-40B4-BE49-F238E27FC236}">
+                <a16:creationId xmlns:a16="http://schemas.microsoft.com/office/drawing/2014/main" id="{ED0378C5-6F20-D3EC-EB0A-F3B0D7F4F839}"/>
+              </a:ext>
+            </a:extLst>
+          </p:cNvPr>
+          <p:cNvSpPr txBox="1">
+            <a:spLocks/>
+          </p:cNvSpPr>
+          <p:nvPr/>
+        </p:nvSpPr>
+        <p:spPr>
+          <a:xfrm>
+            <a:off x="990600" y="517525"/>
+            <a:ext cx="10515600" cy="1325563"/>
+          </a:xfrm>
+          <a:prstGeom prst="rect">
+            <a:avLst/>
+          </a:prstGeom>
+        </p:spPr>
+        <p:txBody>
+          <a:bodyPr vert="horz" lIns="91440" tIns="45720" rIns="91440" bIns="45720" rtlCol="0" anchor="ctr">
+            <a:normAutofit/>
+          </a:bodyPr>
+          <a:lstStyle>
+            <a:lvl1pPr algn="l" defTabSz="914400" rtl="0" eaLnBrk="1" latinLnBrk="0" hangingPunct="1">
+              <a:lnSpc>
+                <a:spcPct val="90000"/>
+              </a:lnSpc>
+              <a:spcBef>
+                <a:spcPct val="0"/>
+              </a:spcBef>
+              <a:buNone/>
+              <a:defRPr sz="4400" kern="1200">
+                <a:solidFill>
+                  <a:schemeClr val="tx1"/>
+                </a:solidFill>
+                <a:latin typeface="+mj-lt"/>
+                <a:ea typeface="+mj-ea"/>
+                <a:cs typeface="+mj-cs"/>
+              </a:defRPr>
+            </a:lvl1pPr>
+          </a:lstStyle>
+          <a:p>
+            <a:r>
+              <a:rPr lang="en-AU" dirty="0"/>
+              <a:t>Monitoring</a:t>
+            </a:r>
           </a:p>
         </p:txBody>
       </p:sp>
     </p:spTree>
     <p:extLst>
       <p:ext uri="{BB962C8B-B14F-4D97-AF65-F5344CB8AC3E}">
-        <p14:creationId xmlns:p14="http://schemas.microsoft.com/office/powerpoint/2010/main" val="2471368188"/>
+        <p14:creationId xmlns:p14="http://schemas.microsoft.com/office/powerpoint/2010/main" val="3945841099"/>
       </p:ext>
     </p:extLst>
   </p:cSld>
@@ -3986,7 +4847,7 @@
 <file path=ppt/theme/theme1.xml><?xml version="1.0" encoding="utf-8"?>
 <a:theme xmlns:a="http://schemas.openxmlformats.org/drawingml/2006/main" name="Office Theme">
   <a:themeElements>
-    <a:clrScheme name="Office">
+    <a:clrScheme name="Office Theme">
       <a:dk1>
         <a:sysClr val="windowText" lastClr="000000"/>
       </a:dk1>
@@ -4024,7 +4885,7 @@
         <a:srgbClr val="954F72"/>
       </a:folHlink>
     </a:clrScheme>
-    <a:fontScheme name="Office">
+    <a:fontScheme name="Office Theme">
       <a:majorFont>
         <a:latin typeface="Calibri Light" panose="020F0302020204030204"/>
         <a:ea typeface=""/>
@@ -4059,23 +4920,6 @@
         <a:font script="Viet" typeface="Times New Roman"/>
         <a:font script="Uigh" typeface="Microsoft Uighur"/>
         <a:font script="Geor" typeface="Sylfaen"/>
-        <a:font script="Armn" typeface="Arial"/>
-        <a:font script="Bugi" typeface="Leelawadee UI"/>
-        <a:font script="Bopo" typeface="Microsoft JhengHei"/>
-        <a:font script="Java" typeface="Javanese Text"/>
-        <a:font script="Lisu" typeface="Segoe UI"/>
-        <a:font script="Mymr" typeface="Myanmar Text"/>
-        <a:font script="Nkoo" typeface="Ebrima"/>
-        <a:font script="Olck" typeface="Nirmala UI"/>
-        <a:font script="Osma" typeface="Ebrima"/>
-        <a:font script="Phag" typeface="Phagspa"/>
-        <a:font script="Syrn" typeface="Estrangelo Edessa"/>
-        <a:font script="Syrj" typeface="Estrangelo Edessa"/>
-        <a:font script="Syre" typeface="Estrangelo Edessa"/>
-        <a:font script="Sora" typeface="Nirmala UI"/>
-        <a:font script="Tale" typeface="Microsoft Tai Le"/>
-        <a:font script="Talu" typeface="Microsoft New Tai Lue"/>
-        <a:font script="Tfng" typeface="Ebrima"/>
       </a:majorFont>
       <a:minorFont>
         <a:latin typeface="Calibri" panose="020F0502020204030204"/>
@@ -4111,26 +4955,9 @@
         <a:font script="Viet" typeface="Arial"/>
         <a:font script="Uigh" typeface="Microsoft Uighur"/>
         <a:font script="Geor" typeface="Sylfaen"/>
-        <a:font script="Armn" typeface="Arial"/>
-        <a:font script="Bugi" typeface="Leelawadee UI"/>
-        <a:font script="Bopo" typeface="Microsoft JhengHei"/>
-        <a:font script="Java" typeface="Javanese Text"/>
-        <a:font script="Lisu" typeface="Segoe UI"/>
-        <a:font script="Mymr" typeface="Myanmar Text"/>
-        <a:font script="Nkoo" typeface="Ebrima"/>
-        <a:font script="Olck" typeface="Nirmala UI"/>
-        <a:font script="Osma" typeface="Ebrima"/>
-        <a:font script="Phag" typeface="Phagspa"/>
-        <a:font script="Syrn" typeface="Estrangelo Edessa"/>
-        <a:font script="Syrj" typeface="Estrangelo Edessa"/>
-        <a:font script="Syre" typeface="Estrangelo Edessa"/>
-        <a:font script="Sora" typeface="Nirmala UI"/>
-        <a:font script="Tale" typeface="Microsoft Tai Le"/>
-        <a:font script="Talu" typeface="Microsoft New Tai Lue"/>
-        <a:font script="Tfng" typeface="Ebrima"/>
       </a:minorFont>
     </a:fontScheme>
-    <a:fmtScheme name="Office">
+    <a:fmtScheme name="Office Theme">
       <a:fillStyleLst>
         <a:solidFill>
           <a:schemeClr val="phClr"/>
@@ -4272,7 +5099,7 @@
   <a:extraClrSchemeLst/>
   <a:extLst>
     <a:ext uri="{05A4C25C-085E-4340-85A3-A5531E510DB2}">
-      <thm15:themeFamily xmlns:thm15="http://schemas.microsoft.com/office/thememl/2012/main" name="Office Theme" id="{62F939B6-93AF-4DB8-9C6B-D6C7DFDC589F}" vid="{4A3C46E8-61CC-4603-A589-7422A47A8E4A}"/>
+      <thm15:themeFamily xmlns:thm15="http://schemas.microsoft.com/office/thememl/2012/main" name="Office Theme 2013 - 2022" id="{62F939B6-93AF-4DB8-9C6B-D6C7DFDC589F}" vid="{4F46216B-77A9-411A-B9D3-5023FCB70208}"/>
     </a:ext>
   </a:extLst>
 </a:theme>

</xml_diff>